<commit_message>
Ontology figures added, work on document
</commit_message>
<xml_diff>
--- a/PASS-STandardisierungsdokument/20181026-Ontologie-Bilder/20181206 Bilder PASS Ontologie.pptx
+++ b/PASS-STandardisierungsdokument/20181026-Ontologie-Bilder/20181206 Bilder PASS Ontologie.pptx
@@ -15,8 +15,13 @@
     <p:sldId id="264" r:id="rId9"/>
     <p:sldId id="265" r:id="rId10"/>
     <p:sldId id="266" r:id="rId11"/>
-    <p:sldId id="267" r:id="rId12"/>
-    <p:sldId id="263" r:id="rId13"/>
+    <p:sldId id="271" r:id="rId12"/>
+    <p:sldId id="272" r:id="rId13"/>
+    <p:sldId id="267" r:id="rId14"/>
+    <p:sldId id="270" r:id="rId15"/>
+    <p:sldId id="269" r:id="rId16"/>
+    <p:sldId id="268" r:id="rId17"/>
+    <p:sldId id="263" r:id="rId18"/>
   </p:sldIdLst>
   <p:sldSz cx="12192000" cy="6858000"/>
   <p:notesSz cx="6858000" cy="9945688"/>
@@ -281,7 +286,7 @@
           <a:p>
             <a:fld id="{FAC7D415-4FCB-40B8-AFE4-66E5B3A59286}" type="datetimeFigureOut">
               <a:rPr lang="de-DE" smtClean="0"/>
-              <a:t>10.12.2018</a:t>
+              <a:t>17.12.2018</a:t>
             </a:fld>
             <a:endParaRPr lang="de-DE"/>
           </a:p>
@@ -479,7 +484,7 @@
           <a:p>
             <a:fld id="{FAC7D415-4FCB-40B8-AFE4-66E5B3A59286}" type="datetimeFigureOut">
               <a:rPr lang="de-DE" smtClean="0"/>
-              <a:t>10.12.2018</a:t>
+              <a:t>17.12.2018</a:t>
             </a:fld>
             <a:endParaRPr lang="de-DE"/>
           </a:p>
@@ -687,7 +692,7 @@
           <a:p>
             <a:fld id="{FAC7D415-4FCB-40B8-AFE4-66E5B3A59286}" type="datetimeFigureOut">
               <a:rPr lang="de-DE" smtClean="0"/>
-              <a:t>10.12.2018</a:t>
+              <a:t>17.12.2018</a:t>
             </a:fld>
             <a:endParaRPr lang="de-DE"/>
           </a:p>
@@ -885,7 +890,7 @@
           <a:p>
             <a:fld id="{FAC7D415-4FCB-40B8-AFE4-66E5B3A59286}" type="datetimeFigureOut">
               <a:rPr lang="de-DE" smtClean="0"/>
-              <a:t>10.12.2018</a:t>
+              <a:t>17.12.2018</a:t>
             </a:fld>
             <a:endParaRPr lang="de-DE"/>
           </a:p>
@@ -1160,7 +1165,7 @@
           <a:p>
             <a:fld id="{FAC7D415-4FCB-40B8-AFE4-66E5B3A59286}" type="datetimeFigureOut">
               <a:rPr lang="de-DE" smtClean="0"/>
-              <a:t>10.12.2018</a:t>
+              <a:t>17.12.2018</a:t>
             </a:fld>
             <a:endParaRPr lang="de-DE"/>
           </a:p>
@@ -1425,7 +1430,7 @@
           <a:p>
             <a:fld id="{FAC7D415-4FCB-40B8-AFE4-66E5B3A59286}" type="datetimeFigureOut">
               <a:rPr lang="de-DE" smtClean="0"/>
-              <a:t>10.12.2018</a:t>
+              <a:t>17.12.2018</a:t>
             </a:fld>
             <a:endParaRPr lang="de-DE"/>
           </a:p>
@@ -1837,7 +1842,7 @@
           <a:p>
             <a:fld id="{FAC7D415-4FCB-40B8-AFE4-66E5B3A59286}" type="datetimeFigureOut">
               <a:rPr lang="de-DE" smtClean="0"/>
-              <a:t>10.12.2018</a:t>
+              <a:t>17.12.2018</a:t>
             </a:fld>
             <a:endParaRPr lang="de-DE"/>
           </a:p>
@@ -1978,7 +1983,7 @@
           <a:p>
             <a:fld id="{FAC7D415-4FCB-40B8-AFE4-66E5B3A59286}" type="datetimeFigureOut">
               <a:rPr lang="de-DE" smtClean="0"/>
-              <a:t>10.12.2018</a:t>
+              <a:t>17.12.2018</a:t>
             </a:fld>
             <a:endParaRPr lang="de-DE"/>
           </a:p>
@@ -2091,7 +2096,7 @@
           <a:p>
             <a:fld id="{FAC7D415-4FCB-40B8-AFE4-66E5B3A59286}" type="datetimeFigureOut">
               <a:rPr lang="de-DE" smtClean="0"/>
-              <a:t>10.12.2018</a:t>
+              <a:t>17.12.2018</a:t>
             </a:fld>
             <a:endParaRPr lang="de-DE"/>
           </a:p>
@@ -2402,7 +2407,7 @@
           <a:p>
             <a:fld id="{FAC7D415-4FCB-40B8-AFE4-66E5B3A59286}" type="datetimeFigureOut">
               <a:rPr lang="de-DE" smtClean="0"/>
-              <a:t>10.12.2018</a:t>
+              <a:t>17.12.2018</a:t>
             </a:fld>
             <a:endParaRPr lang="de-DE"/>
           </a:p>
@@ -2690,7 +2695,7 @@
           <a:p>
             <a:fld id="{FAC7D415-4FCB-40B8-AFE4-66E5B3A59286}" type="datetimeFigureOut">
               <a:rPr lang="de-DE" smtClean="0"/>
-              <a:t>10.12.2018</a:t>
+              <a:t>17.12.2018</a:t>
             </a:fld>
             <a:endParaRPr lang="de-DE"/>
           </a:p>
@@ -2931,7 +2936,7 @@
           <a:p>
             <a:fld id="{FAC7D415-4FCB-40B8-AFE4-66E5B3A59286}" type="datetimeFigureOut">
               <a:rPr lang="de-DE" smtClean="0"/>
-              <a:t>10.12.2018</a:t>
+              <a:t>17.12.2018</a:t>
             </a:fld>
             <a:endParaRPr lang="de-DE"/>
           </a:p>
@@ -3586,7 +3591,7 @@
           <p:cNvPr id="2" name="Titel 1">
             <a:extLst>
               <a:ext uri="{FF2B5EF4-FFF2-40B4-BE49-F238E27FC236}">
-                <a16:creationId xmlns:a16="http://schemas.microsoft.com/office/drawing/2014/main" id="{51C253C8-E1CB-4AC7-9706-5F59B4AFF561}"/>
+                <a16:creationId xmlns:a16="http://schemas.microsoft.com/office/drawing/2014/main" id="{2995FD77-0073-4CBD-B879-55A2EA4E8E4C}"/>
               </a:ext>
             </a:extLst>
           </p:cNvPr>
@@ -3608,6 +3613,2284 @@
       </p:sp>
       <p:pic>
         <p:nvPicPr>
+          <p:cNvPr id="4" name="Grafik 3">
+            <a:extLst>
+              <a:ext uri="{FF2B5EF4-FFF2-40B4-BE49-F238E27FC236}">
+                <a16:creationId xmlns:a16="http://schemas.microsoft.com/office/drawing/2014/main" id="{9B3EE21B-2419-400C-A039-FFDA0C8A4C46}"/>
+              </a:ext>
+            </a:extLst>
+          </p:cNvPr>
+          <p:cNvPicPr>
+            <a:picLocks noChangeAspect="1"/>
+          </p:cNvPicPr>
+          <p:nvPr/>
+        </p:nvPicPr>
+        <p:blipFill rotWithShape="1">
+          <a:blip r:embed="rId2">
+            <a:extLst>
+              <a:ext uri="{28A0092B-C50C-407E-A947-70E740481C1C}">
+                <a14:useLocalDpi xmlns:a14="http://schemas.microsoft.com/office/drawing/2010/main" val="0"/>
+              </a:ext>
+            </a:extLst>
+          </a:blip>
+          <a:srcRect l="8357" t="10370" r="2470" b="54921"/>
+          <a:stretch/>
+        </p:blipFill>
+        <p:spPr>
+          <a:xfrm>
+            <a:off x="2402113" y="2830286"/>
+            <a:ext cx="7366001" cy="2380343"/>
+          </a:xfrm>
+          <a:prstGeom prst="rect">
+            <a:avLst/>
+          </a:prstGeom>
+        </p:spPr>
+      </p:pic>
+      <p:grpSp>
+        <p:nvGrpSpPr>
+          <p:cNvPr id="8" name="Gruppieren 7">
+            <a:extLst>
+              <a:ext uri="{FF2B5EF4-FFF2-40B4-BE49-F238E27FC236}">
+                <a16:creationId xmlns:a16="http://schemas.microsoft.com/office/drawing/2014/main" id="{AE029255-7C47-4850-A747-1DC362C4D9F1}"/>
+              </a:ext>
+            </a:extLst>
+          </p:cNvPr>
+          <p:cNvGrpSpPr/>
+          <p:nvPr/>
+        </p:nvGrpSpPr>
+        <p:grpSpPr>
+          <a:xfrm>
+            <a:off x="8146130" y="4953394"/>
+            <a:ext cx="435650" cy="261610"/>
+            <a:chOff x="8889900" y="4512530"/>
+            <a:chExt cx="435650" cy="261610"/>
+          </a:xfrm>
+        </p:grpSpPr>
+        <p:sp>
+          <p:nvSpPr>
+            <p:cNvPr id="9" name="Ellipse 8">
+              <a:extLst>
+                <a:ext uri="{FF2B5EF4-FFF2-40B4-BE49-F238E27FC236}">
+                  <a16:creationId xmlns:a16="http://schemas.microsoft.com/office/drawing/2014/main" id="{79393570-8E81-4A38-B560-3D7796B88625}"/>
+                </a:ext>
+              </a:extLst>
+            </p:cNvPr>
+            <p:cNvSpPr/>
+            <p:nvPr/>
+          </p:nvSpPr>
+          <p:spPr>
+            <a:xfrm>
+              <a:off x="8962858" y="4533089"/>
+              <a:ext cx="239949" cy="220493"/>
+            </a:xfrm>
+            <a:prstGeom prst="ellipse">
+              <a:avLst/>
+            </a:prstGeom>
+          </p:spPr>
+          <p:style>
+            <a:lnRef idx="2">
+              <a:schemeClr val="accent1">
+                <a:shade val="50000"/>
+              </a:schemeClr>
+            </a:lnRef>
+            <a:fillRef idx="1">
+              <a:schemeClr val="accent1"/>
+            </a:fillRef>
+            <a:effectRef idx="0">
+              <a:schemeClr val="accent1"/>
+            </a:effectRef>
+            <a:fontRef idx="minor">
+              <a:schemeClr val="lt1"/>
+            </a:fontRef>
+          </p:style>
+          <p:txBody>
+            <a:bodyPr rtlCol="0" anchor="ctr"/>
+            <a:lstStyle/>
+            <a:p>
+              <a:pPr algn="ctr"/>
+              <a:endParaRPr lang="de-DE" sz="1200" dirty="0"/>
+            </a:p>
+          </p:txBody>
+        </p:sp>
+        <p:sp>
+          <p:nvSpPr>
+            <p:cNvPr id="10" name="Textfeld 9">
+              <a:extLst>
+                <a:ext uri="{FF2B5EF4-FFF2-40B4-BE49-F238E27FC236}">
+                  <a16:creationId xmlns:a16="http://schemas.microsoft.com/office/drawing/2014/main" id="{09E97C34-CDDB-49B5-BFB9-5BBA14251E37}"/>
+                </a:ext>
+              </a:extLst>
+            </p:cNvPr>
+            <p:cNvSpPr txBox="1"/>
+            <p:nvPr/>
+          </p:nvSpPr>
+          <p:spPr>
+            <a:xfrm flipH="1">
+              <a:off x="8889900" y="4512530"/>
+              <a:ext cx="435650" cy="261610"/>
+            </a:xfrm>
+            <a:prstGeom prst="rect">
+              <a:avLst/>
+            </a:prstGeom>
+            <a:noFill/>
+          </p:spPr>
+          <p:txBody>
+            <a:bodyPr wrap="square" rtlCol="0">
+              <a:spAutoFit/>
+            </a:bodyPr>
+            <a:lstStyle/>
+            <a:p>
+              <a:r>
+                <a:rPr lang="de-DE" sz="1100" dirty="0">
+                  <a:solidFill>
+                    <a:schemeClr val="bg1"/>
+                  </a:solidFill>
+                </a:rPr>
+                <a:t>200</a:t>
+              </a:r>
+            </a:p>
+          </p:txBody>
+        </p:sp>
+      </p:grpSp>
+      <p:grpSp>
+        <p:nvGrpSpPr>
+          <p:cNvPr id="38" name="Gruppieren 37">
+            <a:extLst>
+              <a:ext uri="{FF2B5EF4-FFF2-40B4-BE49-F238E27FC236}">
+                <a16:creationId xmlns:a16="http://schemas.microsoft.com/office/drawing/2014/main" id="{86EE6D45-E6B8-4FB3-9751-8E7D10E46518}"/>
+              </a:ext>
+            </a:extLst>
+          </p:cNvPr>
+          <p:cNvGrpSpPr/>
+          <p:nvPr/>
+        </p:nvGrpSpPr>
+        <p:grpSpPr>
+          <a:xfrm>
+            <a:off x="7650494" y="4097839"/>
+            <a:ext cx="435650" cy="261610"/>
+            <a:chOff x="8889900" y="4512530"/>
+            <a:chExt cx="435650" cy="261610"/>
+          </a:xfrm>
+        </p:grpSpPr>
+        <p:sp>
+          <p:nvSpPr>
+            <p:cNvPr id="39" name="Ellipse 38">
+              <a:extLst>
+                <a:ext uri="{FF2B5EF4-FFF2-40B4-BE49-F238E27FC236}">
+                  <a16:creationId xmlns:a16="http://schemas.microsoft.com/office/drawing/2014/main" id="{A4A92A5E-7D63-4409-9710-17CEAC28660E}"/>
+                </a:ext>
+              </a:extLst>
+            </p:cNvPr>
+            <p:cNvSpPr/>
+            <p:nvPr/>
+          </p:nvSpPr>
+          <p:spPr>
+            <a:xfrm>
+              <a:off x="8962858" y="4533089"/>
+              <a:ext cx="239949" cy="220493"/>
+            </a:xfrm>
+            <a:prstGeom prst="ellipse">
+              <a:avLst/>
+            </a:prstGeom>
+          </p:spPr>
+          <p:style>
+            <a:lnRef idx="2">
+              <a:schemeClr val="accent1">
+                <a:shade val="50000"/>
+              </a:schemeClr>
+            </a:lnRef>
+            <a:fillRef idx="1">
+              <a:schemeClr val="accent1"/>
+            </a:fillRef>
+            <a:effectRef idx="0">
+              <a:schemeClr val="accent1"/>
+            </a:effectRef>
+            <a:fontRef idx="minor">
+              <a:schemeClr val="lt1"/>
+            </a:fontRef>
+          </p:style>
+          <p:txBody>
+            <a:bodyPr rtlCol="0" anchor="ctr"/>
+            <a:lstStyle/>
+            <a:p>
+              <a:pPr algn="ctr"/>
+              <a:endParaRPr lang="de-DE" sz="1200" dirty="0"/>
+            </a:p>
+          </p:txBody>
+        </p:sp>
+        <p:sp>
+          <p:nvSpPr>
+            <p:cNvPr id="40" name="Textfeld 39">
+              <a:extLst>
+                <a:ext uri="{FF2B5EF4-FFF2-40B4-BE49-F238E27FC236}">
+                  <a16:creationId xmlns:a16="http://schemas.microsoft.com/office/drawing/2014/main" id="{7E9C8915-C519-4D2F-89A1-59753F9CED72}"/>
+                </a:ext>
+              </a:extLst>
+            </p:cNvPr>
+            <p:cNvSpPr txBox="1"/>
+            <p:nvPr/>
+          </p:nvSpPr>
+          <p:spPr>
+            <a:xfrm flipH="1">
+              <a:off x="8889900" y="4512530"/>
+              <a:ext cx="435650" cy="261610"/>
+            </a:xfrm>
+            <a:prstGeom prst="rect">
+              <a:avLst/>
+            </a:prstGeom>
+            <a:noFill/>
+          </p:spPr>
+          <p:txBody>
+            <a:bodyPr wrap="square" rtlCol="0">
+              <a:spAutoFit/>
+            </a:bodyPr>
+            <a:lstStyle/>
+            <a:p>
+              <a:r>
+                <a:rPr lang="de-DE" sz="1100" dirty="0">
+                  <a:solidFill>
+                    <a:schemeClr val="bg1"/>
+                  </a:solidFill>
+                </a:rPr>
+                <a:t>085</a:t>
+              </a:r>
+            </a:p>
+          </p:txBody>
+        </p:sp>
+      </p:grpSp>
+      <p:grpSp>
+        <p:nvGrpSpPr>
+          <p:cNvPr id="41" name="Gruppieren 40">
+            <a:extLst>
+              <a:ext uri="{FF2B5EF4-FFF2-40B4-BE49-F238E27FC236}">
+                <a16:creationId xmlns:a16="http://schemas.microsoft.com/office/drawing/2014/main" id="{8E0EC9CD-FFC9-4026-97E1-1EBE5CA93F67}"/>
+              </a:ext>
+            </a:extLst>
+          </p:cNvPr>
+          <p:cNvGrpSpPr/>
+          <p:nvPr/>
+        </p:nvGrpSpPr>
+        <p:grpSpPr>
+          <a:xfrm>
+            <a:off x="5453553" y="4197855"/>
+            <a:ext cx="435650" cy="261610"/>
+            <a:chOff x="8889900" y="4512530"/>
+            <a:chExt cx="435650" cy="261610"/>
+          </a:xfrm>
+        </p:grpSpPr>
+        <p:sp>
+          <p:nvSpPr>
+            <p:cNvPr id="42" name="Ellipse 41">
+              <a:extLst>
+                <a:ext uri="{FF2B5EF4-FFF2-40B4-BE49-F238E27FC236}">
+                  <a16:creationId xmlns:a16="http://schemas.microsoft.com/office/drawing/2014/main" id="{20537B79-E7E4-4D82-B1B3-545AB6B16E0A}"/>
+                </a:ext>
+              </a:extLst>
+            </p:cNvPr>
+            <p:cNvSpPr/>
+            <p:nvPr/>
+          </p:nvSpPr>
+          <p:spPr>
+            <a:xfrm>
+              <a:off x="8962858" y="4533089"/>
+              <a:ext cx="239949" cy="220493"/>
+            </a:xfrm>
+            <a:prstGeom prst="ellipse">
+              <a:avLst/>
+            </a:prstGeom>
+          </p:spPr>
+          <p:style>
+            <a:lnRef idx="2">
+              <a:schemeClr val="accent1">
+                <a:shade val="50000"/>
+              </a:schemeClr>
+            </a:lnRef>
+            <a:fillRef idx="1">
+              <a:schemeClr val="accent1"/>
+            </a:fillRef>
+            <a:effectRef idx="0">
+              <a:schemeClr val="accent1"/>
+            </a:effectRef>
+            <a:fontRef idx="minor">
+              <a:schemeClr val="lt1"/>
+            </a:fontRef>
+          </p:style>
+          <p:txBody>
+            <a:bodyPr rtlCol="0" anchor="ctr"/>
+            <a:lstStyle/>
+            <a:p>
+              <a:pPr algn="ctr"/>
+              <a:endParaRPr lang="de-DE" sz="1200" dirty="0"/>
+            </a:p>
+          </p:txBody>
+        </p:sp>
+        <p:sp>
+          <p:nvSpPr>
+            <p:cNvPr id="43" name="Textfeld 42">
+              <a:extLst>
+                <a:ext uri="{FF2B5EF4-FFF2-40B4-BE49-F238E27FC236}">
+                  <a16:creationId xmlns:a16="http://schemas.microsoft.com/office/drawing/2014/main" id="{108C89DA-1DC7-4CE1-8F8D-597A3DB11111}"/>
+                </a:ext>
+              </a:extLst>
+            </p:cNvPr>
+            <p:cNvSpPr txBox="1"/>
+            <p:nvPr/>
+          </p:nvSpPr>
+          <p:spPr>
+            <a:xfrm flipH="1">
+              <a:off x="8889900" y="4512530"/>
+              <a:ext cx="435650" cy="261610"/>
+            </a:xfrm>
+            <a:prstGeom prst="rect">
+              <a:avLst/>
+            </a:prstGeom>
+            <a:noFill/>
+          </p:spPr>
+          <p:txBody>
+            <a:bodyPr wrap="square" rtlCol="0">
+              <a:spAutoFit/>
+            </a:bodyPr>
+            <a:lstStyle/>
+            <a:p>
+              <a:r>
+                <a:rPr lang="de-DE" sz="1100" dirty="0">
+                  <a:solidFill>
+                    <a:schemeClr val="bg1"/>
+                  </a:solidFill>
+                </a:rPr>
+                <a:t>069</a:t>
+              </a:r>
+            </a:p>
+          </p:txBody>
+        </p:sp>
+      </p:grpSp>
+      <p:grpSp>
+        <p:nvGrpSpPr>
+          <p:cNvPr id="44" name="Gruppieren 43">
+            <a:extLst>
+              <a:ext uri="{FF2B5EF4-FFF2-40B4-BE49-F238E27FC236}">
+                <a16:creationId xmlns:a16="http://schemas.microsoft.com/office/drawing/2014/main" id="{E054316F-4323-49A7-BEED-D04CAC8EBA44}"/>
+              </a:ext>
+            </a:extLst>
+          </p:cNvPr>
+          <p:cNvGrpSpPr/>
+          <p:nvPr/>
+        </p:nvGrpSpPr>
+        <p:grpSpPr>
+          <a:xfrm>
+            <a:off x="4670793" y="4201432"/>
+            <a:ext cx="435650" cy="261610"/>
+            <a:chOff x="8889900" y="4512530"/>
+            <a:chExt cx="435650" cy="261610"/>
+          </a:xfrm>
+        </p:grpSpPr>
+        <p:sp>
+          <p:nvSpPr>
+            <p:cNvPr id="45" name="Ellipse 44">
+              <a:extLst>
+                <a:ext uri="{FF2B5EF4-FFF2-40B4-BE49-F238E27FC236}">
+                  <a16:creationId xmlns:a16="http://schemas.microsoft.com/office/drawing/2014/main" id="{F50E0A01-C17C-4E05-ACF6-A5AF3C114A8C}"/>
+                </a:ext>
+              </a:extLst>
+            </p:cNvPr>
+            <p:cNvSpPr/>
+            <p:nvPr/>
+          </p:nvSpPr>
+          <p:spPr>
+            <a:xfrm>
+              <a:off x="8962858" y="4533089"/>
+              <a:ext cx="239949" cy="220493"/>
+            </a:xfrm>
+            <a:prstGeom prst="ellipse">
+              <a:avLst/>
+            </a:prstGeom>
+          </p:spPr>
+          <p:style>
+            <a:lnRef idx="2">
+              <a:schemeClr val="accent1">
+                <a:shade val="50000"/>
+              </a:schemeClr>
+            </a:lnRef>
+            <a:fillRef idx="1">
+              <a:schemeClr val="accent1"/>
+            </a:fillRef>
+            <a:effectRef idx="0">
+              <a:schemeClr val="accent1"/>
+            </a:effectRef>
+            <a:fontRef idx="minor">
+              <a:schemeClr val="lt1"/>
+            </a:fontRef>
+          </p:style>
+          <p:txBody>
+            <a:bodyPr rtlCol="0" anchor="ctr"/>
+            <a:lstStyle/>
+            <a:p>
+              <a:pPr algn="ctr"/>
+              <a:endParaRPr lang="de-DE" sz="1200" dirty="0"/>
+            </a:p>
+          </p:txBody>
+        </p:sp>
+        <p:sp>
+          <p:nvSpPr>
+            <p:cNvPr id="46" name="Textfeld 45">
+              <a:extLst>
+                <a:ext uri="{FF2B5EF4-FFF2-40B4-BE49-F238E27FC236}">
+                  <a16:creationId xmlns:a16="http://schemas.microsoft.com/office/drawing/2014/main" id="{CBF31144-4843-4535-9FE8-09B69B1BDB5C}"/>
+                </a:ext>
+              </a:extLst>
+            </p:cNvPr>
+            <p:cNvSpPr txBox="1"/>
+            <p:nvPr/>
+          </p:nvSpPr>
+          <p:spPr>
+            <a:xfrm flipH="1">
+              <a:off x="8889900" y="4512530"/>
+              <a:ext cx="435650" cy="261610"/>
+            </a:xfrm>
+            <a:prstGeom prst="rect">
+              <a:avLst/>
+            </a:prstGeom>
+            <a:noFill/>
+          </p:spPr>
+          <p:txBody>
+            <a:bodyPr wrap="square" rtlCol="0">
+              <a:spAutoFit/>
+            </a:bodyPr>
+            <a:lstStyle/>
+            <a:p>
+              <a:r>
+                <a:rPr lang="de-DE" sz="1100" dirty="0">
+                  <a:solidFill>
+                    <a:schemeClr val="bg1"/>
+                  </a:solidFill>
+                </a:rPr>
+                <a:t>055</a:t>
+              </a:r>
+            </a:p>
+          </p:txBody>
+        </p:sp>
+      </p:grpSp>
+      <p:grpSp>
+        <p:nvGrpSpPr>
+          <p:cNvPr id="47" name="Gruppieren 46">
+            <a:extLst>
+              <a:ext uri="{FF2B5EF4-FFF2-40B4-BE49-F238E27FC236}">
+                <a16:creationId xmlns:a16="http://schemas.microsoft.com/office/drawing/2014/main" id="{A0FBF526-B50F-48B6-9582-E63B26714248}"/>
+              </a:ext>
+            </a:extLst>
+          </p:cNvPr>
+          <p:cNvGrpSpPr/>
+          <p:nvPr/>
+        </p:nvGrpSpPr>
+        <p:grpSpPr>
+          <a:xfrm>
+            <a:off x="6323081" y="4197855"/>
+            <a:ext cx="435650" cy="261610"/>
+            <a:chOff x="8889900" y="4512530"/>
+            <a:chExt cx="435650" cy="261610"/>
+          </a:xfrm>
+        </p:grpSpPr>
+        <p:sp>
+          <p:nvSpPr>
+            <p:cNvPr id="48" name="Ellipse 47">
+              <a:extLst>
+                <a:ext uri="{FF2B5EF4-FFF2-40B4-BE49-F238E27FC236}">
+                  <a16:creationId xmlns:a16="http://schemas.microsoft.com/office/drawing/2014/main" id="{BE948DCF-9F71-4392-AC57-A7F149A04398}"/>
+                </a:ext>
+              </a:extLst>
+            </p:cNvPr>
+            <p:cNvSpPr/>
+            <p:nvPr/>
+          </p:nvSpPr>
+          <p:spPr>
+            <a:xfrm>
+              <a:off x="8962858" y="4533089"/>
+              <a:ext cx="239949" cy="220493"/>
+            </a:xfrm>
+            <a:prstGeom prst="ellipse">
+              <a:avLst/>
+            </a:prstGeom>
+          </p:spPr>
+          <p:style>
+            <a:lnRef idx="2">
+              <a:schemeClr val="accent1">
+                <a:shade val="50000"/>
+              </a:schemeClr>
+            </a:lnRef>
+            <a:fillRef idx="1">
+              <a:schemeClr val="accent1"/>
+            </a:fillRef>
+            <a:effectRef idx="0">
+              <a:schemeClr val="accent1"/>
+            </a:effectRef>
+            <a:fontRef idx="minor">
+              <a:schemeClr val="lt1"/>
+            </a:fontRef>
+          </p:style>
+          <p:txBody>
+            <a:bodyPr rtlCol="0" anchor="ctr"/>
+            <a:lstStyle/>
+            <a:p>
+              <a:pPr algn="ctr"/>
+              <a:endParaRPr lang="de-DE" sz="1200" dirty="0"/>
+            </a:p>
+          </p:txBody>
+        </p:sp>
+        <p:sp>
+          <p:nvSpPr>
+            <p:cNvPr id="49" name="Textfeld 48">
+              <a:extLst>
+                <a:ext uri="{FF2B5EF4-FFF2-40B4-BE49-F238E27FC236}">
+                  <a16:creationId xmlns:a16="http://schemas.microsoft.com/office/drawing/2014/main" id="{AA5B5109-D764-4727-AE11-C7CBA0C7A915}"/>
+                </a:ext>
+              </a:extLst>
+            </p:cNvPr>
+            <p:cNvSpPr txBox="1"/>
+            <p:nvPr/>
+          </p:nvSpPr>
+          <p:spPr>
+            <a:xfrm flipH="1">
+              <a:off x="8889900" y="4512530"/>
+              <a:ext cx="435650" cy="261610"/>
+            </a:xfrm>
+            <a:prstGeom prst="rect">
+              <a:avLst/>
+            </a:prstGeom>
+            <a:noFill/>
+          </p:spPr>
+          <p:txBody>
+            <a:bodyPr wrap="square" rtlCol="0">
+              <a:spAutoFit/>
+            </a:bodyPr>
+            <a:lstStyle/>
+            <a:p>
+              <a:r>
+                <a:rPr lang="de-DE" sz="1100" dirty="0">
+                  <a:solidFill>
+                    <a:schemeClr val="bg1"/>
+                  </a:solidFill>
+                </a:rPr>
+                <a:t>001</a:t>
+              </a:r>
+            </a:p>
+          </p:txBody>
+        </p:sp>
+      </p:grpSp>
+      <p:grpSp>
+        <p:nvGrpSpPr>
+          <p:cNvPr id="50" name="Gruppieren 49">
+            <a:extLst>
+              <a:ext uri="{FF2B5EF4-FFF2-40B4-BE49-F238E27FC236}">
+                <a16:creationId xmlns:a16="http://schemas.microsoft.com/office/drawing/2014/main" id="{8CF9F8B1-3F9A-47CC-9D0F-7BB05CB5784D}"/>
+              </a:ext>
+            </a:extLst>
+          </p:cNvPr>
+          <p:cNvGrpSpPr/>
+          <p:nvPr/>
+        </p:nvGrpSpPr>
+        <p:grpSpPr>
+          <a:xfrm>
+            <a:off x="3670208" y="4177296"/>
+            <a:ext cx="435650" cy="261610"/>
+            <a:chOff x="8889900" y="4512530"/>
+            <a:chExt cx="435650" cy="261610"/>
+          </a:xfrm>
+        </p:grpSpPr>
+        <p:sp>
+          <p:nvSpPr>
+            <p:cNvPr id="51" name="Ellipse 50">
+              <a:extLst>
+                <a:ext uri="{FF2B5EF4-FFF2-40B4-BE49-F238E27FC236}">
+                  <a16:creationId xmlns:a16="http://schemas.microsoft.com/office/drawing/2014/main" id="{2A473415-12C4-403F-8E0A-ECCD06460FB4}"/>
+                </a:ext>
+              </a:extLst>
+            </p:cNvPr>
+            <p:cNvSpPr/>
+            <p:nvPr/>
+          </p:nvSpPr>
+          <p:spPr>
+            <a:xfrm>
+              <a:off x="8962858" y="4533089"/>
+              <a:ext cx="239949" cy="220493"/>
+            </a:xfrm>
+            <a:prstGeom prst="ellipse">
+              <a:avLst/>
+            </a:prstGeom>
+          </p:spPr>
+          <p:style>
+            <a:lnRef idx="2">
+              <a:schemeClr val="accent1">
+                <a:shade val="50000"/>
+              </a:schemeClr>
+            </a:lnRef>
+            <a:fillRef idx="1">
+              <a:schemeClr val="accent1"/>
+            </a:fillRef>
+            <a:effectRef idx="0">
+              <a:schemeClr val="accent1"/>
+            </a:effectRef>
+            <a:fontRef idx="minor">
+              <a:schemeClr val="lt1"/>
+            </a:fontRef>
+          </p:style>
+          <p:txBody>
+            <a:bodyPr rtlCol="0" anchor="ctr"/>
+            <a:lstStyle/>
+            <a:p>
+              <a:pPr algn="ctr"/>
+              <a:endParaRPr lang="de-DE" sz="1200" dirty="0"/>
+            </a:p>
+          </p:txBody>
+        </p:sp>
+        <p:sp>
+          <p:nvSpPr>
+            <p:cNvPr id="52" name="Textfeld 51">
+              <a:extLst>
+                <a:ext uri="{FF2B5EF4-FFF2-40B4-BE49-F238E27FC236}">
+                  <a16:creationId xmlns:a16="http://schemas.microsoft.com/office/drawing/2014/main" id="{4598EF38-3B65-409B-AEEC-622B9950CAA4}"/>
+                </a:ext>
+              </a:extLst>
+            </p:cNvPr>
+            <p:cNvSpPr txBox="1"/>
+            <p:nvPr/>
+          </p:nvSpPr>
+          <p:spPr>
+            <a:xfrm flipH="1">
+              <a:off x="8889900" y="4512530"/>
+              <a:ext cx="435650" cy="261610"/>
+            </a:xfrm>
+            <a:prstGeom prst="rect">
+              <a:avLst/>
+            </a:prstGeom>
+            <a:noFill/>
+          </p:spPr>
+          <p:txBody>
+            <a:bodyPr wrap="square" rtlCol="0">
+              <a:spAutoFit/>
+            </a:bodyPr>
+            <a:lstStyle/>
+            <a:p>
+              <a:r>
+                <a:rPr lang="de-DE" sz="1100" dirty="0">
+                  <a:solidFill>
+                    <a:schemeClr val="bg1"/>
+                  </a:solidFill>
+                </a:rPr>
+                <a:t>084</a:t>
+              </a:r>
+            </a:p>
+          </p:txBody>
+        </p:sp>
+      </p:grpSp>
+      <p:grpSp>
+        <p:nvGrpSpPr>
+          <p:cNvPr id="53" name="Gruppieren 52">
+            <a:extLst>
+              <a:ext uri="{FF2B5EF4-FFF2-40B4-BE49-F238E27FC236}">
+                <a16:creationId xmlns:a16="http://schemas.microsoft.com/office/drawing/2014/main" id="{03983D37-0E8D-4889-BDA3-4D71748356D3}"/>
+              </a:ext>
+            </a:extLst>
+          </p:cNvPr>
+          <p:cNvGrpSpPr/>
+          <p:nvPr/>
+        </p:nvGrpSpPr>
+        <p:grpSpPr>
+          <a:xfrm>
+            <a:off x="7587330" y="4442483"/>
+            <a:ext cx="435650" cy="261610"/>
+            <a:chOff x="8889900" y="4512530"/>
+            <a:chExt cx="435650" cy="261610"/>
+          </a:xfrm>
+        </p:grpSpPr>
+        <p:sp>
+          <p:nvSpPr>
+            <p:cNvPr id="54" name="Ellipse 53">
+              <a:extLst>
+                <a:ext uri="{FF2B5EF4-FFF2-40B4-BE49-F238E27FC236}">
+                  <a16:creationId xmlns:a16="http://schemas.microsoft.com/office/drawing/2014/main" id="{D4486FBA-A9C0-4148-9CDF-4BCEF9A06452}"/>
+                </a:ext>
+              </a:extLst>
+            </p:cNvPr>
+            <p:cNvSpPr/>
+            <p:nvPr/>
+          </p:nvSpPr>
+          <p:spPr>
+            <a:xfrm>
+              <a:off x="8962858" y="4533089"/>
+              <a:ext cx="239949" cy="220493"/>
+            </a:xfrm>
+            <a:prstGeom prst="ellipse">
+              <a:avLst/>
+            </a:prstGeom>
+          </p:spPr>
+          <p:style>
+            <a:lnRef idx="2">
+              <a:schemeClr val="accent1">
+                <a:shade val="50000"/>
+              </a:schemeClr>
+            </a:lnRef>
+            <a:fillRef idx="1">
+              <a:schemeClr val="accent1"/>
+            </a:fillRef>
+            <a:effectRef idx="0">
+              <a:schemeClr val="accent1"/>
+            </a:effectRef>
+            <a:fontRef idx="minor">
+              <a:schemeClr val="lt1"/>
+            </a:fontRef>
+          </p:style>
+          <p:txBody>
+            <a:bodyPr rtlCol="0" anchor="ctr"/>
+            <a:lstStyle/>
+            <a:p>
+              <a:pPr algn="ctr"/>
+              <a:endParaRPr lang="de-DE" sz="1200" dirty="0"/>
+            </a:p>
+          </p:txBody>
+        </p:sp>
+        <p:sp>
+          <p:nvSpPr>
+            <p:cNvPr id="55" name="Textfeld 54">
+              <a:extLst>
+                <a:ext uri="{FF2B5EF4-FFF2-40B4-BE49-F238E27FC236}">
+                  <a16:creationId xmlns:a16="http://schemas.microsoft.com/office/drawing/2014/main" id="{875577F7-3290-4CD2-8185-E455B9A7D382}"/>
+                </a:ext>
+              </a:extLst>
+            </p:cNvPr>
+            <p:cNvSpPr txBox="1"/>
+            <p:nvPr/>
+          </p:nvSpPr>
+          <p:spPr>
+            <a:xfrm flipH="1">
+              <a:off x="8889900" y="4512530"/>
+              <a:ext cx="435650" cy="261610"/>
+            </a:xfrm>
+            <a:prstGeom prst="rect">
+              <a:avLst/>
+            </a:prstGeom>
+            <a:noFill/>
+          </p:spPr>
+          <p:txBody>
+            <a:bodyPr wrap="square" rtlCol="0">
+              <a:spAutoFit/>
+            </a:bodyPr>
+            <a:lstStyle/>
+            <a:p>
+              <a:r>
+                <a:rPr lang="de-DE" sz="1100" dirty="0">
+                  <a:solidFill>
+                    <a:schemeClr val="bg1"/>
+                  </a:solidFill>
+                </a:rPr>
+                <a:t>201</a:t>
+              </a:r>
+            </a:p>
+          </p:txBody>
+        </p:sp>
+      </p:grpSp>
+    </p:spTree>
+    <p:extLst>
+      <p:ext uri="{BB962C8B-B14F-4D97-AF65-F5344CB8AC3E}">
+        <p14:creationId xmlns:p14="http://schemas.microsoft.com/office/powerpoint/2010/main" val="1645604654"/>
+      </p:ext>
+    </p:extLst>
+  </p:cSld>
+  <p:clrMapOvr>
+    <a:masterClrMapping/>
+  </p:clrMapOvr>
+</p:sld>
+</file>
+
+<file path=ppt/slides/slide12.xml><?xml version="1.0" encoding="utf-8"?>
+<p:sld xmlns:a="http://schemas.openxmlformats.org/drawingml/2006/main" xmlns:r="http://schemas.openxmlformats.org/officeDocument/2006/relationships" xmlns:p="http://schemas.openxmlformats.org/presentationml/2006/main">
+  <p:cSld>
+    <p:spTree>
+      <p:nvGrpSpPr>
+        <p:cNvPr id="1" name=""/>
+        <p:cNvGrpSpPr/>
+        <p:nvPr/>
+      </p:nvGrpSpPr>
+      <p:grpSpPr>
+        <a:xfrm>
+          <a:off x="0" y="0"/>
+          <a:ext cx="0" cy="0"/>
+          <a:chOff x="0" y="0"/>
+          <a:chExt cx="0" cy="0"/>
+        </a:xfrm>
+      </p:grpSpPr>
+      <p:sp>
+        <p:nvSpPr>
+          <p:cNvPr id="2" name="Titel 1">
+            <a:extLst>
+              <a:ext uri="{FF2B5EF4-FFF2-40B4-BE49-F238E27FC236}">
+                <a16:creationId xmlns:a16="http://schemas.microsoft.com/office/drawing/2014/main" id="{84297644-0CD5-450A-890C-26005090FE36}"/>
+              </a:ext>
+            </a:extLst>
+          </p:cNvPr>
+          <p:cNvSpPr>
+            <a:spLocks noGrp="1"/>
+          </p:cNvSpPr>
+          <p:nvPr>
+            <p:ph type="title"/>
+          </p:nvPr>
+        </p:nvSpPr>
+        <p:spPr/>
+        <p:txBody>
+          <a:bodyPr/>
+          <a:lstStyle/>
+          <a:p>
+            <a:r>
+              <a:rPr lang="de-DE" dirty="0"/>
+              <a:t>PASS </a:t>
+            </a:r>
+            <a:r>
+              <a:rPr lang="de-DE" dirty="0" err="1"/>
+              <a:t>ProcessModell</a:t>
+            </a:r>
+            <a:endParaRPr lang="de-DE" dirty="0"/>
+          </a:p>
+        </p:txBody>
+      </p:sp>
+      <p:pic>
+        <p:nvPicPr>
+          <p:cNvPr id="5" name="Grafik 4">
+            <a:extLst>
+              <a:ext uri="{FF2B5EF4-FFF2-40B4-BE49-F238E27FC236}">
+                <a16:creationId xmlns:a16="http://schemas.microsoft.com/office/drawing/2014/main" id="{BFEEB0BB-6FE8-4270-9EE0-6B2A42142D1A}"/>
+              </a:ext>
+            </a:extLst>
+          </p:cNvPr>
+          <p:cNvPicPr>
+            <a:picLocks noChangeAspect="1"/>
+          </p:cNvPicPr>
+          <p:nvPr/>
+        </p:nvPicPr>
+        <p:blipFill>
+          <a:blip r:embed="rId2"/>
+          <a:stretch>
+            <a:fillRect/>
+          </a:stretch>
+        </p:blipFill>
+        <p:spPr>
+          <a:xfrm>
+            <a:off x="7727586" y="907142"/>
+            <a:ext cx="3166213" cy="2206171"/>
+          </a:xfrm>
+          <a:prstGeom prst="rect">
+            <a:avLst/>
+          </a:prstGeom>
+        </p:spPr>
+      </p:pic>
+      <p:pic>
+        <p:nvPicPr>
+          <p:cNvPr id="6" name="Grafik 5">
+            <a:extLst>
+              <a:ext uri="{FF2B5EF4-FFF2-40B4-BE49-F238E27FC236}">
+                <a16:creationId xmlns:a16="http://schemas.microsoft.com/office/drawing/2014/main" id="{595A9162-15BD-45FD-9216-3CB24D1000D2}"/>
+              </a:ext>
+            </a:extLst>
+          </p:cNvPr>
+          <p:cNvPicPr>
+            <a:picLocks noChangeAspect="1"/>
+          </p:cNvPicPr>
+          <p:nvPr/>
+        </p:nvPicPr>
+        <p:blipFill>
+          <a:blip r:embed="rId3"/>
+          <a:stretch>
+            <a:fillRect/>
+          </a:stretch>
+        </p:blipFill>
+        <p:spPr>
+          <a:xfrm>
+            <a:off x="7608007" y="3608388"/>
+            <a:ext cx="3792495" cy="2084595"/>
+          </a:xfrm>
+          <a:prstGeom prst="rect">
+            <a:avLst/>
+          </a:prstGeom>
+        </p:spPr>
+      </p:pic>
+      <p:pic>
+        <p:nvPicPr>
+          <p:cNvPr id="8" name="Grafik 7">
+            <a:extLst>
+              <a:ext uri="{FF2B5EF4-FFF2-40B4-BE49-F238E27FC236}">
+                <a16:creationId xmlns:a16="http://schemas.microsoft.com/office/drawing/2014/main" id="{5861D0B7-E5E9-470E-974F-AB9983568579}"/>
+              </a:ext>
+            </a:extLst>
+          </p:cNvPr>
+          <p:cNvPicPr>
+            <a:picLocks noChangeAspect="1"/>
+          </p:cNvPicPr>
+          <p:nvPr/>
+        </p:nvPicPr>
+        <p:blipFill rotWithShape="1">
+          <a:blip r:embed="rId4">
+            <a:extLst>
+              <a:ext uri="{28A0092B-C50C-407E-A947-70E740481C1C}">
+                <a14:useLocalDpi xmlns:a14="http://schemas.microsoft.com/office/drawing/2010/main" val="0"/>
+              </a:ext>
+            </a:extLst>
+          </a:blip>
+          <a:srcRect l="6662" t="16719" r="42820" b="19894"/>
+          <a:stretch/>
+        </p:blipFill>
+        <p:spPr>
+          <a:xfrm>
+            <a:off x="1166198" y="2023768"/>
+            <a:ext cx="5667829" cy="4347029"/>
+          </a:xfrm>
+          <a:prstGeom prst="rect">
+            <a:avLst/>
+          </a:prstGeom>
+        </p:spPr>
+      </p:pic>
+      <p:grpSp>
+        <p:nvGrpSpPr>
+          <p:cNvPr id="9" name="Gruppieren 8">
+            <a:extLst>
+              <a:ext uri="{FF2B5EF4-FFF2-40B4-BE49-F238E27FC236}">
+                <a16:creationId xmlns:a16="http://schemas.microsoft.com/office/drawing/2014/main" id="{2F63D3A1-F565-4494-8F87-E4702D5B883D}"/>
+              </a:ext>
+            </a:extLst>
+          </p:cNvPr>
+          <p:cNvGrpSpPr/>
+          <p:nvPr/>
+        </p:nvGrpSpPr>
+        <p:grpSpPr>
+          <a:xfrm>
+            <a:off x="3148620" y="2856983"/>
+            <a:ext cx="435650" cy="261610"/>
+            <a:chOff x="8889900" y="4512530"/>
+            <a:chExt cx="435650" cy="261610"/>
+          </a:xfrm>
+        </p:grpSpPr>
+        <p:sp>
+          <p:nvSpPr>
+            <p:cNvPr id="10" name="Ellipse 9">
+              <a:extLst>
+                <a:ext uri="{FF2B5EF4-FFF2-40B4-BE49-F238E27FC236}">
+                  <a16:creationId xmlns:a16="http://schemas.microsoft.com/office/drawing/2014/main" id="{ED15BBE5-9205-4CED-A2BA-962DEB7337DE}"/>
+                </a:ext>
+              </a:extLst>
+            </p:cNvPr>
+            <p:cNvSpPr/>
+            <p:nvPr/>
+          </p:nvSpPr>
+          <p:spPr>
+            <a:xfrm>
+              <a:off x="8962858" y="4533089"/>
+              <a:ext cx="239949" cy="220493"/>
+            </a:xfrm>
+            <a:prstGeom prst="ellipse">
+              <a:avLst/>
+            </a:prstGeom>
+          </p:spPr>
+          <p:style>
+            <a:lnRef idx="2">
+              <a:schemeClr val="accent1">
+                <a:shade val="50000"/>
+              </a:schemeClr>
+            </a:lnRef>
+            <a:fillRef idx="1">
+              <a:schemeClr val="accent1"/>
+            </a:fillRef>
+            <a:effectRef idx="0">
+              <a:schemeClr val="accent1"/>
+            </a:effectRef>
+            <a:fontRef idx="minor">
+              <a:schemeClr val="lt1"/>
+            </a:fontRef>
+          </p:style>
+          <p:txBody>
+            <a:bodyPr rtlCol="0" anchor="ctr"/>
+            <a:lstStyle/>
+            <a:p>
+              <a:pPr algn="ctr"/>
+              <a:endParaRPr lang="de-DE" sz="1200" dirty="0"/>
+            </a:p>
+          </p:txBody>
+        </p:sp>
+        <p:sp>
+          <p:nvSpPr>
+            <p:cNvPr id="11" name="Textfeld 10">
+              <a:extLst>
+                <a:ext uri="{FF2B5EF4-FFF2-40B4-BE49-F238E27FC236}">
+                  <a16:creationId xmlns:a16="http://schemas.microsoft.com/office/drawing/2014/main" id="{5835E4B6-884D-439D-A77B-6E128ED1F162}"/>
+                </a:ext>
+              </a:extLst>
+            </p:cNvPr>
+            <p:cNvSpPr txBox="1"/>
+            <p:nvPr/>
+          </p:nvSpPr>
+          <p:spPr>
+            <a:xfrm flipH="1">
+              <a:off x="8889900" y="4512530"/>
+              <a:ext cx="435650" cy="261610"/>
+            </a:xfrm>
+            <a:prstGeom prst="rect">
+              <a:avLst/>
+            </a:prstGeom>
+            <a:noFill/>
+          </p:spPr>
+          <p:txBody>
+            <a:bodyPr wrap="square" rtlCol="0">
+              <a:spAutoFit/>
+            </a:bodyPr>
+            <a:lstStyle/>
+            <a:p>
+              <a:r>
+                <a:rPr lang="de-DE" sz="1100" dirty="0">
+                  <a:solidFill>
+                    <a:schemeClr val="bg1"/>
+                  </a:solidFill>
+                </a:rPr>
+                <a:t>208</a:t>
+              </a:r>
+            </a:p>
+          </p:txBody>
+        </p:sp>
+      </p:grpSp>
+      <p:grpSp>
+        <p:nvGrpSpPr>
+          <p:cNvPr id="12" name="Gruppieren 11">
+            <a:extLst>
+              <a:ext uri="{FF2B5EF4-FFF2-40B4-BE49-F238E27FC236}">
+                <a16:creationId xmlns:a16="http://schemas.microsoft.com/office/drawing/2014/main" id="{5723E6BC-60B5-4035-8C4A-F8BF4E684059}"/>
+              </a:ext>
+            </a:extLst>
+          </p:cNvPr>
+          <p:cNvGrpSpPr/>
+          <p:nvPr/>
+        </p:nvGrpSpPr>
+        <p:grpSpPr>
+          <a:xfrm>
+            <a:off x="3148620" y="2078632"/>
+            <a:ext cx="435650" cy="261610"/>
+            <a:chOff x="8889900" y="4512530"/>
+            <a:chExt cx="435650" cy="261610"/>
+          </a:xfrm>
+        </p:grpSpPr>
+        <p:sp>
+          <p:nvSpPr>
+            <p:cNvPr id="13" name="Ellipse 12">
+              <a:extLst>
+                <a:ext uri="{FF2B5EF4-FFF2-40B4-BE49-F238E27FC236}">
+                  <a16:creationId xmlns:a16="http://schemas.microsoft.com/office/drawing/2014/main" id="{2252F706-1EFF-43A5-B1C4-013DA0F783F0}"/>
+                </a:ext>
+              </a:extLst>
+            </p:cNvPr>
+            <p:cNvSpPr/>
+            <p:nvPr/>
+          </p:nvSpPr>
+          <p:spPr>
+            <a:xfrm>
+              <a:off x="8962858" y="4533089"/>
+              <a:ext cx="239949" cy="220493"/>
+            </a:xfrm>
+            <a:prstGeom prst="ellipse">
+              <a:avLst/>
+            </a:prstGeom>
+          </p:spPr>
+          <p:style>
+            <a:lnRef idx="2">
+              <a:schemeClr val="accent1">
+                <a:shade val="50000"/>
+              </a:schemeClr>
+            </a:lnRef>
+            <a:fillRef idx="1">
+              <a:schemeClr val="accent1"/>
+            </a:fillRef>
+            <a:effectRef idx="0">
+              <a:schemeClr val="accent1"/>
+            </a:effectRef>
+            <a:fontRef idx="minor">
+              <a:schemeClr val="lt1"/>
+            </a:fontRef>
+          </p:style>
+          <p:txBody>
+            <a:bodyPr rtlCol="0" anchor="ctr"/>
+            <a:lstStyle/>
+            <a:p>
+              <a:pPr algn="ctr"/>
+              <a:endParaRPr lang="de-DE" sz="1200" dirty="0"/>
+            </a:p>
+          </p:txBody>
+        </p:sp>
+        <p:sp>
+          <p:nvSpPr>
+            <p:cNvPr id="14" name="Textfeld 13">
+              <a:extLst>
+                <a:ext uri="{FF2B5EF4-FFF2-40B4-BE49-F238E27FC236}">
+                  <a16:creationId xmlns:a16="http://schemas.microsoft.com/office/drawing/2014/main" id="{09DA9FA3-3D1D-46C6-A5AC-27639B3DFC97}"/>
+                </a:ext>
+              </a:extLst>
+            </p:cNvPr>
+            <p:cNvSpPr txBox="1"/>
+            <p:nvPr/>
+          </p:nvSpPr>
+          <p:spPr>
+            <a:xfrm flipH="1">
+              <a:off x="8889900" y="4512530"/>
+              <a:ext cx="435650" cy="261610"/>
+            </a:xfrm>
+            <a:prstGeom prst="rect">
+              <a:avLst/>
+            </a:prstGeom>
+            <a:noFill/>
+          </p:spPr>
+          <p:txBody>
+            <a:bodyPr wrap="square" rtlCol="0">
+              <a:spAutoFit/>
+            </a:bodyPr>
+            <a:lstStyle/>
+            <a:p>
+              <a:r>
+                <a:rPr lang="de-DE" sz="1100" dirty="0">
+                  <a:solidFill>
+                    <a:schemeClr val="bg1"/>
+                  </a:solidFill>
+                </a:rPr>
+                <a:t>208</a:t>
+              </a:r>
+            </a:p>
+          </p:txBody>
+        </p:sp>
+      </p:grpSp>
+      <p:grpSp>
+        <p:nvGrpSpPr>
+          <p:cNvPr id="15" name="Gruppieren 14">
+            <a:extLst>
+              <a:ext uri="{FF2B5EF4-FFF2-40B4-BE49-F238E27FC236}">
+                <a16:creationId xmlns:a16="http://schemas.microsoft.com/office/drawing/2014/main" id="{AF27CB00-E61E-4916-9D5C-3A854B30460E}"/>
+              </a:ext>
+            </a:extLst>
+          </p:cNvPr>
+          <p:cNvGrpSpPr/>
+          <p:nvPr/>
+        </p:nvGrpSpPr>
+        <p:grpSpPr>
+          <a:xfrm>
+            <a:off x="4506967" y="3551088"/>
+            <a:ext cx="435650" cy="261610"/>
+            <a:chOff x="8889900" y="4512530"/>
+            <a:chExt cx="435650" cy="261610"/>
+          </a:xfrm>
+        </p:grpSpPr>
+        <p:sp>
+          <p:nvSpPr>
+            <p:cNvPr id="16" name="Ellipse 15">
+              <a:extLst>
+                <a:ext uri="{FF2B5EF4-FFF2-40B4-BE49-F238E27FC236}">
+                  <a16:creationId xmlns:a16="http://schemas.microsoft.com/office/drawing/2014/main" id="{E1A8FB65-B79F-4B07-AC1E-689509B4725F}"/>
+                </a:ext>
+              </a:extLst>
+            </p:cNvPr>
+            <p:cNvSpPr/>
+            <p:nvPr/>
+          </p:nvSpPr>
+          <p:spPr>
+            <a:xfrm>
+              <a:off x="8962858" y="4533089"/>
+              <a:ext cx="239949" cy="220493"/>
+            </a:xfrm>
+            <a:prstGeom prst="ellipse">
+              <a:avLst/>
+            </a:prstGeom>
+          </p:spPr>
+          <p:style>
+            <a:lnRef idx="2">
+              <a:schemeClr val="accent1">
+                <a:shade val="50000"/>
+              </a:schemeClr>
+            </a:lnRef>
+            <a:fillRef idx="1">
+              <a:schemeClr val="accent1"/>
+            </a:fillRef>
+            <a:effectRef idx="0">
+              <a:schemeClr val="accent1"/>
+            </a:effectRef>
+            <a:fontRef idx="minor">
+              <a:schemeClr val="lt1"/>
+            </a:fontRef>
+          </p:style>
+          <p:txBody>
+            <a:bodyPr rtlCol="0" anchor="ctr"/>
+            <a:lstStyle/>
+            <a:p>
+              <a:pPr algn="ctr"/>
+              <a:endParaRPr lang="de-DE" sz="1200" dirty="0"/>
+            </a:p>
+          </p:txBody>
+        </p:sp>
+        <p:sp>
+          <p:nvSpPr>
+            <p:cNvPr id="17" name="Textfeld 16">
+              <a:extLst>
+                <a:ext uri="{FF2B5EF4-FFF2-40B4-BE49-F238E27FC236}">
+                  <a16:creationId xmlns:a16="http://schemas.microsoft.com/office/drawing/2014/main" id="{63FA16B2-EEB5-4CD0-80CD-860A7E72B166}"/>
+                </a:ext>
+              </a:extLst>
+            </p:cNvPr>
+            <p:cNvSpPr txBox="1"/>
+            <p:nvPr/>
+          </p:nvSpPr>
+          <p:spPr>
+            <a:xfrm flipH="1">
+              <a:off x="8889900" y="4512530"/>
+              <a:ext cx="435650" cy="261610"/>
+            </a:xfrm>
+            <a:prstGeom prst="rect">
+              <a:avLst/>
+            </a:prstGeom>
+            <a:noFill/>
+          </p:spPr>
+          <p:txBody>
+            <a:bodyPr wrap="square" rtlCol="0">
+              <a:spAutoFit/>
+            </a:bodyPr>
+            <a:lstStyle/>
+            <a:p>
+              <a:r>
+                <a:rPr lang="de-DE" sz="1100" dirty="0">
+                  <a:solidFill>
+                    <a:schemeClr val="bg1"/>
+                  </a:solidFill>
+                </a:rPr>
+                <a:t>226</a:t>
+              </a:r>
+            </a:p>
+          </p:txBody>
+        </p:sp>
+      </p:grpSp>
+      <p:grpSp>
+        <p:nvGrpSpPr>
+          <p:cNvPr id="18" name="Gruppieren 17">
+            <a:extLst>
+              <a:ext uri="{FF2B5EF4-FFF2-40B4-BE49-F238E27FC236}">
+                <a16:creationId xmlns:a16="http://schemas.microsoft.com/office/drawing/2014/main" id="{DE2F3C2E-0303-45B1-96B0-98E5BC4959EA}"/>
+              </a:ext>
+            </a:extLst>
+          </p:cNvPr>
+          <p:cNvGrpSpPr/>
+          <p:nvPr/>
+        </p:nvGrpSpPr>
+        <p:grpSpPr>
+          <a:xfrm>
+            <a:off x="3890442" y="3548961"/>
+            <a:ext cx="435650" cy="261610"/>
+            <a:chOff x="8889900" y="4512530"/>
+            <a:chExt cx="435650" cy="261610"/>
+          </a:xfrm>
+        </p:grpSpPr>
+        <p:sp>
+          <p:nvSpPr>
+            <p:cNvPr id="19" name="Ellipse 18">
+              <a:extLst>
+                <a:ext uri="{FF2B5EF4-FFF2-40B4-BE49-F238E27FC236}">
+                  <a16:creationId xmlns:a16="http://schemas.microsoft.com/office/drawing/2014/main" id="{8CB2D3D5-C509-41C6-BF55-51779AC4F337}"/>
+                </a:ext>
+              </a:extLst>
+            </p:cNvPr>
+            <p:cNvSpPr/>
+            <p:nvPr/>
+          </p:nvSpPr>
+          <p:spPr>
+            <a:xfrm>
+              <a:off x="8962858" y="4533089"/>
+              <a:ext cx="239949" cy="220493"/>
+            </a:xfrm>
+            <a:prstGeom prst="ellipse">
+              <a:avLst/>
+            </a:prstGeom>
+          </p:spPr>
+          <p:style>
+            <a:lnRef idx="2">
+              <a:schemeClr val="accent1">
+                <a:shade val="50000"/>
+              </a:schemeClr>
+            </a:lnRef>
+            <a:fillRef idx="1">
+              <a:schemeClr val="accent1"/>
+            </a:fillRef>
+            <a:effectRef idx="0">
+              <a:schemeClr val="accent1"/>
+            </a:effectRef>
+            <a:fontRef idx="minor">
+              <a:schemeClr val="lt1"/>
+            </a:fontRef>
+          </p:style>
+          <p:txBody>
+            <a:bodyPr rtlCol="0" anchor="ctr"/>
+            <a:lstStyle/>
+            <a:p>
+              <a:pPr algn="ctr"/>
+              <a:endParaRPr lang="de-DE" sz="1200" dirty="0"/>
+            </a:p>
+          </p:txBody>
+        </p:sp>
+        <p:sp>
+          <p:nvSpPr>
+            <p:cNvPr id="20" name="Textfeld 19">
+              <a:extLst>
+                <a:ext uri="{FF2B5EF4-FFF2-40B4-BE49-F238E27FC236}">
+                  <a16:creationId xmlns:a16="http://schemas.microsoft.com/office/drawing/2014/main" id="{677A785D-B412-4254-9B2F-A088C8430ED5}"/>
+                </a:ext>
+              </a:extLst>
+            </p:cNvPr>
+            <p:cNvSpPr txBox="1"/>
+            <p:nvPr/>
+          </p:nvSpPr>
+          <p:spPr>
+            <a:xfrm flipH="1">
+              <a:off x="8889900" y="4512530"/>
+              <a:ext cx="435650" cy="261610"/>
+            </a:xfrm>
+            <a:prstGeom prst="rect">
+              <a:avLst/>
+            </a:prstGeom>
+            <a:noFill/>
+          </p:spPr>
+          <p:txBody>
+            <a:bodyPr wrap="square" rtlCol="0">
+              <a:spAutoFit/>
+            </a:bodyPr>
+            <a:lstStyle/>
+            <a:p>
+              <a:r>
+                <a:rPr lang="de-DE" sz="1100" dirty="0">
+                  <a:solidFill>
+                    <a:schemeClr val="bg1"/>
+                  </a:solidFill>
+                </a:rPr>
+                <a:t>226</a:t>
+              </a:r>
+            </a:p>
+          </p:txBody>
+        </p:sp>
+      </p:grpSp>
+      <p:grpSp>
+        <p:nvGrpSpPr>
+          <p:cNvPr id="21" name="Gruppieren 20">
+            <a:extLst>
+              <a:ext uri="{FF2B5EF4-FFF2-40B4-BE49-F238E27FC236}">
+                <a16:creationId xmlns:a16="http://schemas.microsoft.com/office/drawing/2014/main" id="{B40D94C6-0A48-4026-AF27-48347E0260A3}"/>
+              </a:ext>
+            </a:extLst>
+          </p:cNvPr>
+          <p:cNvGrpSpPr/>
+          <p:nvPr/>
+        </p:nvGrpSpPr>
+        <p:grpSpPr>
+          <a:xfrm>
+            <a:off x="2676439" y="3558893"/>
+            <a:ext cx="435650" cy="261610"/>
+            <a:chOff x="8889900" y="4512530"/>
+            <a:chExt cx="435650" cy="261610"/>
+          </a:xfrm>
+        </p:grpSpPr>
+        <p:sp>
+          <p:nvSpPr>
+            <p:cNvPr id="22" name="Ellipse 21">
+              <a:extLst>
+                <a:ext uri="{FF2B5EF4-FFF2-40B4-BE49-F238E27FC236}">
+                  <a16:creationId xmlns:a16="http://schemas.microsoft.com/office/drawing/2014/main" id="{0D1E26EF-6846-4B8A-AD80-6B00EEB045E3}"/>
+                </a:ext>
+              </a:extLst>
+            </p:cNvPr>
+            <p:cNvSpPr/>
+            <p:nvPr/>
+          </p:nvSpPr>
+          <p:spPr>
+            <a:xfrm>
+              <a:off x="8962858" y="4533089"/>
+              <a:ext cx="239949" cy="220493"/>
+            </a:xfrm>
+            <a:prstGeom prst="ellipse">
+              <a:avLst/>
+            </a:prstGeom>
+          </p:spPr>
+          <p:style>
+            <a:lnRef idx="2">
+              <a:schemeClr val="accent1">
+                <a:shade val="50000"/>
+              </a:schemeClr>
+            </a:lnRef>
+            <a:fillRef idx="1">
+              <a:schemeClr val="accent1"/>
+            </a:fillRef>
+            <a:effectRef idx="0">
+              <a:schemeClr val="accent1"/>
+            </a:effectRef>
+            <a:fontRef idx="minor">
+              <a:schemeClr val="lt1"/>
+            </a:fontRef>
+          </p:style>
+          <p:txBody>
+            <a:bodyPr rtlCol="0" anchor="ctr"/>
+            <a:lstStyle/>
+            <a:p>
+              <a:pPr algn="ctr"/>
+              <a:endParaRPr lang="de-DE" sz="1200" dirty="0"/>
+            </a:p>
+          </p:txBody>
+        </p:sp>
+        <p:sp>
+          <p:nvSpPr>
+            <p:cNvPr id="23" name="Textfeld 22">
+              <a:extLst>
+                <a:ext uri="{FF2B5EF4-FFF2-40B4-BE49-F238E27FC236}">
+                  <a16:creationId xmlns:a16="http://schemas.microsoft.com/office/drawing/2014/main" id="{2D9FA1C8-D96C-44A1-9B78-FAA2FF170DA8}"/>
+                </a:ext>
+              </a:extLst>
+            </p:cNvPr>
+            <p:cNvSpPr txBox="1"/>
+            <p:nvPr/>
+          </p:nvSpPr>
+          <p:spPr>
+            <a:xfrm flipH="1">
+              <a:off x="8889900" y="4512530"/>
+              <a:ext cx="435650" cy="261610"/>
+            </a:xfrm>
+            <a:prstGeom prst="rect">
+              <a:avLst/>
+            </a:prstGeom>
+            <a:noFill/>
+          </p:spPr>
+          <p:txBody>
+            <a:bodyPr wrap="square" rtlCol="0">
+              <a:spAutoFit/>
+            </a:bodyPr>
+            <a:lstStyle/>
+            <a:p>
+              <a:r>
+                <a:rPr lang="de-DE" sz="1100" dirty="0">
+                  <a:solidFill>
+                    <a:schemeClr val="bg1"/>
+                  </a:solidFill>
+                </a:rPr>
+                <a:t>229</a:t>
+              </a:r>
+            </a:p>
+          </p:txBody>
+        </p:sp>
+      </p:grpSp>
+      <p:grpSp>
+        <p:nvGrpSpPr>
+          <p:cNvPr id="24" name="Gruppieren 23">
+            <a:extLst>
+              <a:ext uri="{FF2B5EF4-FFF2-40B4-BE49-F238E27FC236}">
+                <a16:creationId xmlns:a16="http://schemas.microsoft.com/office/drawing/2014/main" id="{E7BEB5B0-DE52-49D3-98A2-EA54801E2A04}"/>
+              </a:ext>
+            </a:extLst>
+          </p:cNvPr>
+          <p:cNvGrpSpPr/>
+          <p:nvPr/>
+        </p:nvGrpSpPr>
+        <p:grpSpPr>
+          <a:xfrm>
+            <a:off x="3353399" y="3556420"/>
+            <a:ext cx="435650" cy="261610"/>
+            <a:chOff x="8889900" y="4512530"/>
+            <a:chExt cx="435650" cy="261610"/>
+          </a:xfrm>
+        </p:grpSpPr>
+        <p:sp>
+          <p:nvSpPr>
+            <p:cNvPr id="25" name="Ellipse 24">
+              <a:extLst>
+                <a:ext uri="{FF2B5EF4-FFF2-40B4-BE49-F238E27FC236}">
+                  <a16:creationId xmlns:a16="http://schemas.microsoft.com/office/drawing/2014/main" id="{D7BA5CFC-4F0B-4B83-AAB1-EC797B12D485}"/>
+                </a:ext>
+              </a:extLst>
+            </p:cNvPr>
+            <p:cNvSpPr/>
+            <p:nvPr/>
+          </p:nvSpPr>
+          <p:spPr>
+            <a:xfrm>
+              <a:off x="8962858" y="4533089"/>
+              <a:ext cx="239949" cy="220493"/>
+            </a:xfrm>
+            <a:prstGeom prst="ellipse">
+              <a:avLst/>
+            </a:prstGeom>
+          </p:spPr>
+          <p:style>
+            <a:lnRef idx="2">
+              <a:schemeClr val="accent1">
+                <a:shade val="50000"/>
+              </a:schemeClr>
+            </a:lnRef>
+            <a:fillRef idx="1">
+              <a:schemeClr val="accent1"/>
+            </a:fillRef>
+            <a:effectRef idx="0">
+              <a:schemeClr val="accent1"/>
+            </a:effectRef>
+            <a:fontRef idx="minor">
+              <a:schemeClr val="lt1"/>
+            </a:fontRef>
+          </p:style>
+          <p:txBody>
+            <a:bodyPr rtlCol="0" anchor="ctr"/>
+            <a:lstStyle/>
+            <a:p>
+              <a:pPr algn="ctr"/>
+              <a:endParaRPr lang="de-DE" sz="1200" dirty="0"/>
+            </a:p>
+          </p:txBody>
+        </p:sp>
+        <p:sp>
+          <p:nvSpPr>
+            <p:cNvPr id="26" name="Textfeld 25">
+              <a:extLst>
+                <a:ext uri="{FF2B5EF4-FFF2-40B4-BE49-F238E27FC236}">
+                  <a16:creationId xmlns:a16="http://schemas.microsoft.com/office/drawing/2014/main" id="{818F4908-D659-48C7-82B4-F2BDD55DA519}"/>
+                </a:ext>
+              </a:extLst>
+            </p:cNvPr>
+            <p:cNvSpPr txBox="1"/>
+            <p:nvPr/>
+          </p:nvSpPr>
+          <p:spPr>
+            <a:xfrm flipH="1">
+              <a:off x="8889900" y="4512530"/>
+              <a:ext cx="435650" cy="261610"/>
+            </a:xfrm>
+            <a:prstGeom prst="rect">
+              <a:avLst/>
+            </a:prstGeom>
+            <a:noFill/>
+          </p:spPr>
+          <p:txBody>
+            <a:bodyPr wrap="square" rtlCol="0">
+              <a:spAutoFit/>
+            </a:bodyPr>
+            <a:lstStyle/>
+            <a:p>
+              <a:r>
+                <a:rPr lang="de-DE" sz="1100" dirty="0">
+                  <a:solidFill>
+                    <a:schemeClr val="bg1"/>
+                  </a:solidFill>
+                </a:rPr>
+                <a:t>229</a:t>
+              </a:r>
+            </a:p>
+          </p:txBody>
+        </p:sp>
+      </p:grpSp>
+      <p:grpSp>
+        <p:nvGrpSpPr>
+          <p:cNvPr id="27" name="Gruppieren 26">
+            <a:extLst>
+              <a:ext uri="{FF2B5EF4-FFF2-40B4-BE49-F238E27FC236}">
+                <a16:creationId xmlns:a16="http://schemas.microsoft.com/office/drawing/2014/main" id="{7ACD4172-713C-4BCC-BDF9-276D38375F11}"/>
+              </a:ext>
+            </a:extLst>
+          </p:cNvPr>
+          <p:cNvGrpSpPr/>
+          <p:nvPr/>
+        </p:nvGrpSpPr>
+        <p:grpSpPr>
+          <a:xfrm>
+            <a:off x="4391964" y="4533037"/>
+            <a:ext cx="435650" cy="261610"/>
+            <a:chOff x="8889900" y="4512530"/>
+            <a:chExt cx="435650" cy="261610"/>
+          </a:xfrm>
+        </p:grpSpPr>
+        <p:sp>
+          <p:nvSpPr>
+            <p:cNvPr id="28" name="Ellipse 27">
+              <a:extLst>
+                <a:ext uri="{FF2B5EF4-FFF2-40B4-BE49-F238E27FC236}">
+                  <a16:creationId xmlns:a16="http://schemas.microsoft.com/office/drawing/2014/main" id="{34011F1B-E979-4995-BB5C-04D7FC54B5A8}"/>
+                </a:ext>
+              </a:extLst>
+            </p:cNvPr>
+            <p:cNvSpPr/>
+            <p:nvPr/>
+          </p:nvSpPr>
+          <p:spPr>
+            <a:xfrm>
+              <a:off x="8962858" y="4533089"/>
+              <a:ext cx="239949" cy="220493"/>
+            </a:xfrm>
+            <a:prstGeom prst="ellipse">
+              <a:avLst/>
+            </a:prstGeom>
+          </p:spPr>
+          <p:style>
+            <a:lnRef idx="2">
+              <a:schemeClr val="accent1">
+                <a:shade val="50000"/>
+              </a:schemeClr>
+            </a:lnRef>
+            <a:fillRef idx="1">
+              <a:schemeClr val="accent1"/>
+            </a:fillRef>
+            <a:effectRef idx="0">
+              <a:schemeClr val="accent1"/>
+            </a:effectRef>
+            <a:fontRef idx="minor">
+              <a:schemeClr val="lt1"/>
+            </a:fontRef>
+          </p:style>
+          <p:txBody>
+            <a:bodyPr rtlCol="0" anchor="ctr"/>
+            <a:lstStyle/>
+            <a:p>
+              <a:pPr algn="ctr"/>
+              <a:endParaRPr lang="de-DE" sz="1200" dirty="0"/>
+            </a:p>
+          </p:txBody>
+        </p:sp>
+        <p:sp>
+          <p:nvSpPr>
+            <p:cNvPr id="29" name="Textfeld 28">
+              <a:extLst>
+                <a:ext uri="{FF2B5EF4-FFF2-40B4-BE49-F238E27FC236}">
+                  <a16:creationId xmlns:a16="http://schemas.microsoft.com/office/drawing/2014/main" id="{3B319632-DACC-4410-A228-AE6BA1EC075B}"/>
+                </a:ext>
+              </a:extLst>
+            </p:cNvPr>
+            <p:cNvSpPr txBox="1"/>
+            <p:nvPr/>
+          </p:nvSpPr>
+          <p:spPr>
+            <a:xfrm flipH="1">
+              <a:off x="8889900" y="4512530"/>
+              <a:ext cx="435650" cy="261610"/>
+            </a:xfrm>
+            <a:prstGeom prst="rect">
+              <a:avLst/>
+            </a:prstGeom>
+            <a:noFill/>
+          </p:spPr>
+          <p:txBody>
+            <a:bodyPr wrap="square" rtlCol="0">
+              <a:spAutoFit/>
+            </a:bodyPr>
+            <a:lstStyle/>
+            <a:p>
+              <a:r>
+                <a:rPr lang="de-DE" sz="1100" dirty="0">
+                  <a:solidFill>
+                    <a:schemeClr val="bg1"/>
+                  </a:solidFill>
+                </a:rPr>
+                <a:t>225</a:t>
+              </a:r>
+            </a:p>
+          </p:txBody>
+        </p:sp>
+      </p:grpSp>
+      <p:grpSp>
+        <p:nvGrpSpPr>
+          <p:cNvPr id="30" name="Gruppieren 29">
+            <a:extLst>
+              <a:ext uri="{FF2B5EF4-FFF2-40B4-BE49-F238E27FC236}">
+                <a16:creationId xmlns:a16="http://schemas.microsoft.com/office/drawing/2014/main" id="{67856638-2D44-4DF2-8716-3575EA34AE8A}"/>
+              </a:ext>
+            </a:extLst>
+          </p:cNvPr>
+          <p:cNvGrpSpPr/>
+          <p:nvPr/>
+        </p:nvGrpSpPr>
+        <p:grpSpPr>
+          <a:xfrm>
+            <a:off x="5003828" y="4763774"/>
+            <a:ext cx="435650" cy="261610"/>
+            <a:chOff x="8889900" y="4512530"/>
+            <a:chExt cx="435650" cy="261610"/>
+          </a:xfrm>
+        </p:grpSpPr>
+        <p:sp>
+          <p:nvSpPr>
+            <p:cNvPr id="31" name="Ellipse 30">
+              <a:extLst>
+                <a:ext uri="{FF2B5EF4-FFF2-40B4-BE49-F238E27FC236}">
+                  <a16:creationId xmlns:a16="http://schemas.microsoft.com/office/drawing/2014/main" id="{F3F495E2-B84C-4C3D-9901-C1A65C895BCC}"/>
+                </a:ext>
+              </a:extLst>
+            </p:cNvPr>
+            <p:cNvSpPr/>
+            <p:nvPr/>
+          </p:nvSpPr>
+          <p:spPr>
+            <a:xfrm>
+              <a:off x="8962858" y="4533089"/>
+              <a:ext cx="239949" cy="220493"/>
+            </a:xfrm>
+            <a:prstGeom prst="ellipse">
+              <a:avLst/>
+            </a:prstGeom>
+          </p:spPr>
+          <p:style>
+            <a:lnRef idx="2">
+              <a:schemeClr val="accent1">
+                <a:shade val="50000"/>
+              </a:schemeClr>
+            </a:lnRef>
+            <a:fillRef idx="1">
+              <a:schemeClr val="accent1"/>
+            </a:fillRef>
+            <a:effectRef idx="0">
+              <a:schemeClr val="accent1"/>
+            </a:effectRef>
+            <a:fontRef idx="minor">
+              <a:schemeClr val="lt1"/>
+            </a:fontRef>
+          </p:style>
+          <p:txBody>
+            <a:bodyPr rtlCol="0" anchor="ctr"/>
+            <a:lstStyle/>
+            <a:p>
+              <a:pPr algn="ctr"/>
+              <a:endParaRPr lang="de-DE" sz="1200" dirty="0"/>
+            </a:p>
+          </p:txBody>
+        </p:sp>
+        <p:sp>
+          <p:nvSpPr>
+            <p:cNvPr id="32" name="Textfeld 31">
+              <a:extLst>
+                <a:ext uri="{FF2B5EF4-FFF2-40B4-BE49-F238E27FC236}">
+                  <a16:creationId xmlns:a16="http://schemas.microsoft.com/office/drawing/2014/main" id="{8EF6D453-F41A-4C3B-AEEE-DB77FDD82458}"/>
+                </a:ext>
+              </a:extLst>
+            </p:cNvPr>
+            <p:cNvSpPr txBox="1"/>
+            <p:nvPr/>
+          </p:nvSpPr>
+          <p:spPr>
+            <a:xfrm flipH="1">
+              <a:off x="8889900" y="4512530"/>
+              <a:ext cx="435650" cy="261610"/>
+            </a:xfrm>
+            <a:prstGeom prst="rect">
+              <a:avLst/>
+            </a:prstGeom>
+            <a:noFill/>
+          </p:spPr>
+          <p:txBody>
+            <a:bodyPr wrap="square" rtlCol="0">
+              <a:spAutoFit/>
+            </a:bodyPr>
+            <a:lstStyle/>
+            <a:p>
+              <a:r>
+                <a:rPr lang="de-DE" sz="1100" dirty="0">
+                  <a:solidFill>
+                    <a:schemeClr val="bg1"/>
+                  </a:solidFill>
+                </a:rPr>
+                <a:t>227</a:t>
+              </a:r>
+            </a:p>
+          </p:txBody>
+        </p:sp>
+      </p:grpSp>
+      <p:grpSp>
+        <p:nvGrpSpPr>
+          <p:cNvPr id="39" name="Gruppieren 38">
+            <a:extLst>
+              <a:ext uri="{FF2B5EF4-FFF2-40B4-BE49-F238E27FC236}">
+                <a16:creationId xmlns:a16="http://schemas.microsoft.com/office/drawing/2014/main" id="{1F27466B-ACD7-46A0-B11F-428DBE0DAC00}"/>
+              </a:ext>
+            </a:extLst>
+          </p:cNvPr>
+          <p:cNvGrpSpPr/>
+          <p:nvPr/>
+        </p:nvGrpSpPr>
+        <p:grpSpPr>
+          <a:xfrm>
+            <a:off x="2459997" y="5431373"/>
+            <a:ext cx="435650" cy="261610"/>
+            <a:chOff x="8889900" y="4512530"/>
+            <a:chExt cx="435650" cy="261610"/>
+          </a:xfrm>
+        </p:grpSpPr>
+        <p:sp>
+          <p:nvSpPr>
+            <p:cNvPr id="40" name="Ellipse 39">
+              <a:extLst>
+                <a:ext uri="{FF2B5EF4-FFF2-40B4-BE49-F238E27FC236}">
+                  <a16:creationId xmlns:a16="http://schemas.microsoft.com/office/drawing/2014/main" id="{A0344978-2D0E-47F1-BD45-C9CD7BF36FF7}"/>
+                </a:ext>
+              </a:extLst>
+            </p:cNvPr>
+            <p:cNvSpPr/>
+            <p:nvPr/>
+          </p:nvSpPr>
+          <p:spPr>
+            <a:xfrm>
+              <a:off x="8962858" y="4533089"/>
+              <a:ext cx="239949" cy="220493"/>
+            </a:xfrm>
+            <a:prstGeom prst="ellipse">
+              <a:avLst/>
+            </a:prstGeom>
+          </p:spPr>
+          <p:style>
+            <a:lnRef idx="2">
+              <a:schemeClr val="accent1">
+                <a:shade val="50000"/>
+              </a:schemeClr>
+            </a:lnRef>
+            <a:fillRef idx="1">
+              <a:schemeClr val="accent1"/>
+            </a:fillRef>
+            <a:effectRef idx="0">
+              <a:schemeClr val="accent1"/>
+            </a:effectRef>
+            <a:fontRef idx="minor">
+              <a:schemeClr val="lt1"/>
+            </a:fontRef>
+          </p:style>
+          <p:txBody>
+            <a:bodyPr rtlCol="0" anchor="ctr"/>
+            <a:lstStyle/>
+            <a:p>
+              <a:pPr algn="ctr"/>
+              <a:endParaRPr lang="de-DE" sz="1200" dirty="0"/>
+            </a:p>
+          </p:txBody>
+        </p:sp>
+        <p:sp>
+          <p:nvSpPr>
+            <p:cNvPr id="41" name="Textfeld 40">
+              <a:extLst>
+                <a:ext uri="{FF2B5EF4-FFF2-40B4-BE49-F238E27FC236}">
+                  <a16:creationId xmlns:a16="http://schemas.microsoft.com/office/drawing/2014/main" id="{6AAC483D-2545-4CBC-8B7E-86B0DF01764E}"/>
+                </a:ext>
+              </a:extLst>
+            </p:cNvPr>
+            <p:cNvSpPr txBox="1"/>
+            <p:nvPr/>
+          </p:nvSpPr>
+          <p:spPr>
+            <a:xfrm flipH="1">
+              <a:off x="8889900" y="4512530"/>
+              <a:ext cx="435650" cy="261610"/>
+            </a:xfrm>
+            <a:prstGeom prst="rect">
+              <a:avLst/>
+            </a:prstGeom>
+            <a:noFill/>
+          </p:spPr>
+          <p:txBody>
+            <a:bodyPr wrap="square" rtlCol="0">
+              <a:spAutoFit/>
+            </a:bodyPr>
+            <a:lstStyle/>
+            <a:p>
+              <a:r>
+                <a:rPr lang="de-DE" sz="1100" dirty="0">
+                  <a:solidFill>
+                    <a:schemeClr val="bg1"/>
+                  </a:solidFill>
+                </a:rPr>
+                <a:t>122</a:t>
+              </a:r>
+            </a:p>
+          </p:txBody>
+        </p:sp>
+      </p:grpSp>
+      <p:grpSp>
+        <p:nvGrpSpPr>
+          <p:cNvPr id="42" name="Gruppieren 41">
+            <a:extLst>
+              <a:ext uri="{FF2B5EF4-FFF2-40B4-BE49-F238E27FC236}">
+                <a16:creationId xmlns:a16="http://schemas.microsoft.com/office/drawing/2014/main" id="{6CACC28D-0D9A-4776-8424-39D6D524F815}"/>
+              </a:ext>
+            </a:extLst>
+          </p:cNvPr>
+          <p:cNvGrpSpPr/>
+          <p:nvPr/>
+        </p:nvGrpSpPr>
+        <p:grpSpPr>
+          <a:xfrm>
+            <a:off x="4342179" y="2543593"/>
+            <a:ext cx="435650" cy="261610"/>
+            <a:chOff x="8889900" y="4512530"/>
+            <a:chExt cx="435650" cy="261610"/>
+          </a:xfrm>
+        </p:grpSpPr>
+        <p:sp>
+          <p:nvSpPr>
+            <p:cNvPr id="43" name="Ellipse 42">
+              <a:extLst>
+                <a:ext uri="{FF2B5EF4-FFF2-40B4-BE49-F238E27FC236}">
+                  <a16:creationId xmlns:a16="http://schemas.microsoft.com/office/drawing/2014/main" id="{15D46D31-4887-4917-BDD5-591D2CAA4CCB}"/>
+                </a:ext>
+              </a:extLst>
+            </p:cNvPr>
+            <p:cNvSpPr/>
+            <p:nvPr/>
+          </p:nvSpPr>
+          <p:spPr>
+            <a:xfrm>
+              <a:off x="8962858" y="4533089"/>
+              <a:ext cx="239949" cy="220493"/>
+            </a:xfrm>
+            <a:prstGeom prst="ellipse">
+              <a:avLst/>
+            </a:prstGeom>
+          </p:spPr>
+          <p:style>
+            <a:lnRef idx="2">
+              <a:schemeClr val="accent1">
+                <a:shade val="50000"/>
+              </a:schemeClr>
+            </a:lnRef>
+            <a:fillRef idx="1">
+              <a:schemeClr val="accent1"/>
+            </a:fillRef>
+            <a:effectRef idx="0">
+              <a:schemeClr val="accent1"/>
+            </a:effectRef>
+            <a:fontRef idx="minor">
+              <a:schemeClr val="lt1"/>
+            </a:fontRef>
+          </p:style>
+          <p:txBody>
+            <a:bodyPr rtlCol="0" anchor="ctr"/>
+            <a:lstStyle/>
+            <a:p>
+              <a:pPr algn="ctr"/>
+              <a:endParaRPr lang="de-DE" sz="1200" dirty="0"/>
+            </a:p>
+          </p:txBody>
+        </p:sp>
+        <p:sp>
+          <p:nvSpPr>
+            <p:cNvPr id="44" name="Textfeld 43">
+              <a:extLst>
+                <a:ext uri="{FF2B5EF4-FFF2-40B4-BE49-F238E27FC236}">
+                  <a16:creationId xmlns:a16="http://schemas.microsoft.com/office/drawing/2014/main" id="{DECAFE78-3A17-4D3B-B626-5DF59D703607}"/>
+                </a:ext>
+              </a:extLst>
+            </p:cNvPr>
+            <p:cNvSpPr txBox="1"/>
+            <p:nvPr/>
+          </p:nvSpPr>
+          <p:spPr>
+            <a:xfrm flipH="1">
+              <a:off x="8889900" y="4512530"/>
+              <a:ext cx="435650" cy="261610"/>
+            </a:xfrm>
+            <a:prstGeom prst="rect">
+              <a:avLst/>
+            </a:prstGeom>
+            <a:noFill/>
+          </p:spPr>
+          <p:txBody>
+            <a:bodyPr wrap="square" rtlCol="0">
+              <a:spAutoFit/>
+            </a:bodyPr>
+            <a:lstStyle/>
+            <a:p>
+              <a:r>
+                <a:rPr lang="de-DE" sz="1100" dirty="0">
+                  <a:solidFill>
+                    <a:schemeClr val="bg1"/>
+                  </a:solidFill>
+                </a:rPr>
+                <a:t>101</a:t>
+              </a:r>
+            </a:p>
+          </p:txBody>
+        </p:sp>
+      </p:grpSp>
+      <p:grpSp>
+        <p:nvGrpSpPr>
+          <p:cNvPr id="51" name="Gruppieren 50">
+            <a:extLst>
+              <a:ext uri="{FF2B5EF4-FFF2-40B4-BE49-F238E27FC236}">
+                <a16:creationId xmlns:a16="http://schemas.microsoft.com/office/drawing/2014/main" id="{32B31190-666F-496A-B4B0-B2EE167F92CE}"/>
+              </a:ext>
+            </a:extLst>
+          </p:cNvPr>
+          <p:cNvGrpSpPr/>
+          <p:nvPr/>
+        </p:nvGrpSpPr>
+        <p:grpSpPr>
+          <a:xfrm>
+            <a:off x="4911701" y="6102514"/>
+            <a:ext cx="435650" cy="261610"/>
+            <a:chOff x="8889900" y="4512530"/>
+            <a:chExt cx="435650" cy="261610"/>
+          </a:xfrm>
+        </p:grpSpPr>
+        <p:sp>
+          <p:nvSpPr>
+            <p:cNvPr id="52" name="Ellipse 51">
+              <a:extLst>
+                <a:ext uri="{FF2B5EF4-FFF2-40B4-BE49-F238E27FC236}">
+                  <a16:creationId xmlns:a16="http://schemas.microsoft.com/office/drawing/2014/main" id="{F24B8028-DBAF-4E9F-AF67-438C5AC64531}"/>
+                </a:ext>
+              </a:extLst>
+            </p:cNvPr>
+            <p:cNvSpPr/>
+            <p:nvPr/>
+          </p:nvSpPr>
+          <p:spPr>
+            <a:xfrm>
+              <a:off x="8962858" y="4533089"/>
+              <a:ext cx="239949" cy="220493"/>
+            </a:xfrm>
+            <a:prstGeom prst="ellipse">
+              <a:avLst/>
+            </a:prstGeom>
+          </p:spPr>
+          <p:style>
+            <a:lnRef idx="2">
+              <a:schemeClr val="accent1">
+                <a:shade val="50000"/>
+              </a:schemeClr>
+            </a:lnRef>
+            <a:fillRef idx="1">
+              <a:schemeClr val="accent1"/>
+            </a:fillRef>
+            <a:effectRef idx="0">
+              <a:schemeClr val="accent1"/>
+            </a:effectRef>
+            <a:fontRef idx="minor">
+              <a:schemeClr val="lt1"/>
+            </a:fontRef>
+          </p:style>
+          <p:txBody>
+            <a:bodyPr rtlCol="0" anchor="ctr"/>
+            <a:lstStyle/>
+            <a:p>
+              <a:pPr algn="ctr"/>
+              <a:endParaRPr lang="de-DE" sz="1200" dirty="0"/>
+            </a:p>
+          </p:txBody>
+        </p:sp>
+        <p:sp>
+          <p:nvSpPr>
+            <p:cNvPr id="53" name="Textfeld 52">
+              <a:extLst>
+                <a:ext uri="{FF2B5EF4-FFF2-40B4-BE49-F238E27FC236}">
+                  <a16:creationId xmlns:a16="http://schemas.microsoft.com/office/drawing/2014/main" id="{9FA57AAC-7135-4EE3-BFE7-756F250C77FE}"/>
+                </a:ext>
+              </a:extLst>
+            </p:cNvPr>
+            <p:cNvSpPr txBox="1"/>
+            <p:nvPr/>
+          </p:nvSpPr>
+          <p:spPr>
+            <a:xfrm flipH="1">
+              <a:off x="8889900" y="4512530"/>
+              <a:ext cx="435650" cy="261610"/>
+            </a:xfrm>
+            <a:prstGeom prst="rect">
+              <a:avLst/>
+            </a:prstGeom>
+            <a:noFill/>
+          </p:spPr>
+          <p:txBody>
+            <a:bodyPr wrap="square" rtlCol="0">
+              <a:spAutoFit/>
+            </a:bodyPr>
+            <a:lstStyle/>
+            <a:p>
+              <a:r>
+                <a:rPr lang="de-DE" sz="1100" dirty="0">
+                  <a:solidFill>
+                    <a:schemeClr val="bg1"/>
+                  </a:solidFill>
+                </a:rPr>
+                <a:t>216</a:t>
+              </a:r>
+            </a:p>
+          </p:txBody>
+        </p:sp>
+      </p:grpSp>
+      <p:grpSp>
+        <p:nvGrpSpPr>
+          <p:cNvPr id="54" name="Gruppieren 53">
+            <a:extLst>
+              <a:ext uri="{FF2B5EF4-FFF2-40B4-BE49-F238E27FC236}">
+                <a16:creationId xmlns:a16="http://schemas.microsoft.com/office/drawing/2014/main" id="{04334024-72FA-4C50-81C1-E6728FBB29F8}"/>
+              </a:ext>
+            </a:extLst>
+          </p:cNvPr>
+          <p:cNvGrpSpPr/>
+          <p:nvPr/>
+        </p:nvGrpSpPr>
+        <p:grpSpPr>
+          <a:xfrm>
+            <a:off x="4464922" y="5872413"/>
+            <a:ext cx="435650" cy="261610"/>
+            <a:chOff x="8889900" y="4512530"/>
+            <a:chExt cx="435650" cy="261610"/>
+          </a:xfrm>
+        </p:grpSpPr>
+        <p:sp>
+          <p:nvSpPr>
+            <p:cNvPr id="55" name="Ellipse 54">
+              <a:extLst>
+                <a:ext uri="{FF2B5EF4-FFF2-40B4-BE49-F238E27FC236}">
+                  <a16:creationId xmlns:a16="http://schemas.microsoft.com/office/drawing/2014/main" id="{B947DD5E-F55A-4271-BCF2-81E7183688E4}"/>
+                </a:ext>
+              </a:extLst>
+            </p:cNvPr>
+            <p:cNvSpPr/>
+            <p:nvPr/>
+          </p:nvSpPr>
+          <p:spPr>
+            <a:xfrm>
+              <a:off x="8962858" y="4533089"/>
+              <a:ext cx="239949" cy="220493"/>
+            </a:xfrm>
+            <a:prstGeom prst="ellipse">
+              <a:avLst/>
+            </a:prstGeom>
+          </p:spPr>
+          <p:style>
+            <a:lnRef idx="2">
+              <a:schemeClr val="accent1">
+                <a:shade val="50000"/>
+              </a:schemeClr>
+            </a:lnRef>
+            <a:fillRef idx="1">
+              <a:schemeClr val="accent1"/>
+            </a:fillRef>
+            <a:effectRef idx="0">
+              <a:schemeClr val="accent1"/>
+            </a:effectRef>
+            <a:fontRef idx="minor">
+              <a:schemeClr val="lt1"/>
+            </a:fontRef>
+          </p:style>
+          <p:txBody>
+            <a:bodyPr rtlCol="0" anchor="ctr"/>
+            <a:lstStyle/>
+            <a:p>
+              <a:pPr algn="ctr"/>
+              <a:endParaRPr lang="de-DE" sz="1200" dirty="0"/>
+            </a:p>
+          </p:txBody>
+        </p:sp>
+        <p:sp>
+          <p:nvSpPr>
+            <p:cNvPr id="56" name="Textfeld 55">
+              <a:extLst>
+                <a:ext uri="{FF2B5EF4-FFF2-40B4-BE49-F238E27FC236}">
+                  <a16:creationId xmlns:a16="http://schemas.microsoft.com/office/drawing/2014/main" id="{FA2D8AA9-A1B5-471C-8597-2B7C85804AA2}"/>
+                </a:ext>
+              </a:extLst>
+            </p:cNvPr>
+            <p:cNvSpPr txBox="1"/>
+            <p:nvPr/>
+          </p:nvSpPr>
+          <p:spPr>
+            <a:xfrm flipH="1">
+              <a:off x="8889900" y="4512530"/>
+              <a:ext cx="435650" cy="261610"/>
+            </a:xfrm>
+            <a:prstGeom prst="rect">
+              <a:avLst/>
+            </a:prstGeom>
+            <a:noFill/>
+          </p:spPr>
+          <p:txBody>
+            <a:bodyPr wrap="square" rtlCol="0">
+              <a:spAutoFit/>
+            </a:bodyPr>
+            <a:lstStyle/>
+            <a:p>
+              <a:r>
+                <a:rPr lang="de-DE" sz="1100" dirty="0">
+                  <a:solidFill>
+                    <a:schemeClr val="bg1"/>
+                  </a:solidFill>
+                </a:rPr>
+                <a:t>223</a:t>
+              </a:r>
+            </a:p>
+          </p:txBody>
+        </p:sp>
+      </p:grpSp>
+    </p:spTree>
+    <p:extLst>
+      <p:ext uri="{BB962C8B-B14F-4D97-AF65-F5344CB8AC3E}">
+        <p14:creationId xmlns:p14="http://schemas.microsoft.com/office/powerpoint/2010/main" val="1121573286"/>
+      </p:ext>
+    </p:extLst>
+  </p:cSld>
+  <p:clrMapOvr>
+    <a:masterClrMapping/>
+  </p:clrMapOvr>
+</p:sld>
+</file>
+
+<file path=ppt/slides/slide13.xml><?xml version="1.0" encoding="utf-8"?>
+<p:sld xmlns:a="http://schemas.openxmlformats.org/drawingml/2006/main" xmlns:r="http://schemas.openxmlformats.org/officeDocument/2006/relationships" xmlns:p="http://schemas.openxmlformats.org/presentationml/2006/main">
+  <p:cSld>
+    <p:spTree>
+      <p:nvGrpSpPr>
+        <p:cNvPr id="1" name=""/>
+        <p:cNvGrpSpPr/>
+        <p:nvPr/>
+      </p:nvGrpSpPr>
+      <p:grpSpPr>
+        <a:xfrm>
+          <a:off x="0" y="0"/>
+          <a:ext cx="0" cy="0"/>
+          <a:chOff x="0" y="0"/>
+          <a:chExt cx="0" cy="0"/>
+        </a:xfrm>
+      </p:grpSpPr>
+      <p:sp>
+        <p:nvSpPr>
+          <p:cNvPr id="2" name="Titel 1">
+            <a:extLst>
+              <a:ext uri="{FF2B5EF4-FFF2-40B4-BE49-F238E27FC236}">
+                <a16:creationId xmlns:a16="http://schemas.microsoft.com/office/drawing/2014/main" id="{51C253C8-E1CB-4AC7-9706-5F59B4AFF561}"/>
+              </a:ext>
+            </a:extLst>
+          </p:cNvPr>
+          <p:cNvSpPr>
+            <a:spLocks noGrp="1"/>
+          </p:cNvSpPr>
+          <p:nvPr>
+            <p:ph type="title"/>
+          </p:nvPr>
+        </p:nvSpPr>
+        <p:spPr/>
+        <p:txBody>
+          <a:bodyPr/>
+          <a:lstStyle/>
+          <a:p>
+            <a:r>
+              <a:rPr lang="de-DE" dirty="0"/>
+              <a:t>Interaction </a:t>
+            </a:r>
+            <a:r>
+              <a:rPr lang="de-DE" dirty="0" err="1"/>
+              <a:t>Describing</a:t>
+            </a:r>
+            <a:r>
+              <a:rPr lang="de-DE" dirty="0"/>
+              <a:t> </a:t>
+            </a:r>
+            <a:r>
+              <a:rPr lang="de-DE" dirty="0" err="1"/>
+              <a:t>Component</a:t>
+            </a:r>
+            <a:endParaRPr lang="de-DE" dirty="0"/>
+          </a:p>
+        </p:txBody>
+      </p:sp>
+      <p:pic>
+        <p:nvPicPr>
           <p:cNvPr id="8" name="Grafik 7">
             <a:extLst>
               <a:ext uri="{FF2B5EF4-FFF2-40B4-BE49-F238E27FC236}">
@@ -4589,7 +6872,7 @@
                     <a:schemeClr val="bg1"/>
                   </a:solidFill>
                 </a:rPr>
-                <a:t>226</a:t>
+                <a:t>227</a:t>
               </a:r>
             </a:p>
           </p:txBody>
@@ -5013,7 +7296,7 @@
                     <a:schemeClr val="bg1"/>
                   </a:solidFill>
                 </a:rPr>
-                <a:t>223</a:t>
+                <a:t>224</a:t>
               </a:r>
             </a:p>
           </p:txBody>
@@ -5543,7 +7826,7 @@
                     <a:schemeClr val="bg1"/>
                   </a:solidFill>
                 </a:rPr>
-                <a:t>235</a:t>
+                <a:t>236</a:t>
               </a:r>
             </a:p>
           </p:txBody>
@@ -5861,7 +8144,7 @@
                     <a:schemeClr val="bg1"/>
                   </a:solidFill>
                 </a:rPr>
-                <a:t>235</a:t>
+                <a:t>236</a:t>
               </a:r>
             </a:p>
           </p:txBody>
@@ -6305,9 +8588,9 @@
         </p:nvGrpSpPr>
         <p:grpSpPr>
           <a:xfrm>
-            <a:off x="7422355" y="3746901"/>
+            <a:off x="7431980" y="3746901"/>
             <a:ext cx="435650" cy="261610"/>
-            <a:chOff x="8889900" y="4512530"/>
+            <a:chOff x="8899525" y="4512530"/>
             <a:chExt cx="435650" cy="261610"/>
           </a:xfrm>
         </p:grpSpPr>
@@ -6371,7 +8654,7 @@
           </p:nvSpPr>
           <p:spPr>
             <a:xfrm flipH="1">
-              <a:off x="8889900" y="4512530"/>
+              <a:off x="8899525" y="4512530"/>
               <a:ext cx="435650" cy="261610"/>
             </a:xfrm>
             <a:prstGeom prst="rect">
@@ -6391,7 +8674,7 @@
                     <a:schemeClr val="bg1"/>
                   </a:solidFill>
                 </a:rPr>
-                <a:t>235</a:t>
+                <a:t>236</a:t>
               </a:r>
             </a:p>
           </p:txBody>
@@ -6497,7 +8780,7 @@
                     <a:schemeClr val="bg1"/>
                   </a:solidFill>
                 </a:rPr>
-                <a:t>235</a:t>
+                <a:t>236</a:t>
               </a:r>
             </a:p>
           </p:txBody>
@@ -6603,7 +8886,7 @@
                     <a:schemeClr val="bg1"/>
                   </a:solidFill>
                 </a:rPr>
-                <a:t>235</a:t>
+                <a:t>236</a:t>
               </a:r>
             </a:p>
           </p:txBody>
@@ -6728,7 +9011,333 @@
 </p:sld>
 </file>
 
-<file path=ppt/slides/slide12.xml><?xml version="1.0" encoding="utf-8"?>
+<file path=ppt/slides/slide14.xml><?xml version="1.0" encoding="utf-8"?>
+<p:sld xmlns:a="http://schemas.openxmlformats.org/drawingml/2006/main" xmlns:r="http://schemas.openxmlformats.org/officeDocument/2006/relationships" xmlns:p="http://schemas.openxmlformats.org/presentationml/2006/main">
+  <p:cSld>
+    <p:spTree>
+      <p:nvGrpSpPr>
+        <p:cNvPr id="1" name=""/>
+        <p:cNvGrpSpPr/>
+        <p:nvPr/>
+      </p:nvGrpSpPr>
+      <p:grpSpPr>
+        <a:xfrm>
+          <a:off x="0" y="0"/>
+          <a:ext cx="0" cy="0"/>
+          <a:chOff x="0" y="0"/>
+          <a:chExt cx="0" cy="0"/>
+        </a:xfrm>
+      </p:grpSpPr>
+      <p:sp>
+        <p:nvSpPr>
+          <p:cNvPr id="2" name="Titel 1">
+            <a:extLst>
+              <a:ext uri="{FF2B5EF4-FFF2-40B4-BE49-F238E27FC236}">
+                <a16:creationId xmlns:a16="http://schemas.microsoft.com/office/drawing/2014/main" id="{6485D5EF-61D0-40E6-B99A-9DE65C336821}"/>
+              </a:ext>
+            </a:extLst>
+          </p:cNvPr>
+          <p:cNvSpPr>
+            <a:spLocks noGrp="1"/>
+          </p:cNvSpPr>
+          <p:nvPr>
+            <p:ph type="title"/>
+          </p:nvPr>
+        </p:nvSpPr>
+        <p:spPr/>
+        <p:txBody>
+          <a:bodyPr/>
+          <a:lstStyle/>
+          <a:p>
+            <a:r>
+              <a:rPr lang="de-DE" dirty="0"/>
+              <a:t>Data</a:t>
+            </a:r>
+          </a:p>
+        </p:txBody>
+      </p:sp>
+      <p:pic>
+        <p:nvPicPr>
+          <p:cNvPr id="4" name="Grafik 3">
+            <a:extLst>
+              <a:ext uri="{FF2B5EF4-FFF2-40B4-BE49-F238E27FC236}">
+                <a16:creationId xmlns:a16="http://schemas.microsoft.com/office/drawing/2014/main" id="{0069EA7B-602B-499D-9D9D-34A9E65CE83E}"/>
+              </a:ext>
+            </a:extLst>
+          </p:cNvPr>
+          <p:cNvPicPr>
+            <a:picLocks noChangeAspect="1"/>
+          </p:cNvPicPr>
+          <p:nvPr/>
+        </p:nvPicPr>
+        <p:blipFill rotWithShape="1">
+          <a:blip r:embed="rId2">
+            <a:extLst>
+              <a:ext uri="{28A0092B-C50C-407E-A947-70E740481C1C}">
+                <a14:useLocalDpi xmlns:a14="http://schemas.microsoft.com/office/drawing/2010/main" val="0"/>
+              </a:ext>
+            </a:extLst>
+          </a:blip>
+          <a:srcRect l="13274" t="12248" r="43631" b="31093"/>
+          <a:stretch/>
+        </p:blipFill>
+        <p:spPr>
+          <a:xfrm>
+            <a:off x="1618342" y="1233714"/>
+            <a:ext cx="5254171" cy="3294743"/>
+          </a:xfrm>
+          <a:prstGeom prst="rect">
+            <a:avLst/>
+          </a:prstGeom>
+        </p:spPr>
+      </p:pic>
+    </p:spTree>
+    <p:extLst>
+      <p:ext uri="{BB962C8B-B14F-4D97-AF65-F5344CB8AC3E}">
+        <p14:creationId xmlns:p14="http://schemas.microsoft.com/office/powerpoint/2010/main" val="3144022678"/>
+      </p:ext>
+    </p:extLst>
+  </p:cSld>
+  <p:clrMapOvr>
+    <a:masterClrMapping/>
+  </p:clrMapOvr>
+</p:sld>
+</file>
+
+<file path=ppt/slides/slide15.xml><?xml version="1.0" encoding="utf-8"?>
+<p:sld xmlns:a="http://schemas.openxmlformats.org/drawingml/2006/main" xmlns:r="http://schemas.openxmlformats.org/officeDocument/2006/relationships" xmlns:p="http://schemas.openxmlformats.org/presentationml/2006/main">
+  <p:cSld>
+    <p:spTree>
+      <p:nvGrpSpPr>
+        <p:cNvPr id="1" name=""/>
+        <p:cNvGrpSpPr/>
+        <p:nvPr/>
+      </p:nvGrpSpPr>
+      <p:grpSpPr>
+        <a:xfrm>
+          <a:off x="0" y="0"/>
+          <a:ext cx="0" cy="0"/>
+          <a:chOff x="0" y="0"/>
+          <a:chExt cx="0" cy="0"/>
+        </a:xfrm>
+      </p:grpSpPr>
+      <p:sp>
+        <p:nvSpPr>
+          <p:cNvPr id="2" name="Titel 1">
+            <a:extLst>
+              <a:ext uri="{FF2B5EF4-FFF2-40B4-BE49-F238E27FC236}">
+                <a16:creationId xmlns:a16="http://schemas.microsoft.com/office/drawing/2014/main" id="{F9485527-6620-42DE-89EB-2BDBF95801BF}"/>
+              </a:ext>
+            </a:extLst>
+          </p:cNvPr>
+          <p:cNvSpPr>
+            <a:spLocks noGrp="1"/>
+          </p:cNvSpPr>
+          <p:nvPr>
+            <p:ph type="title"/>
+          </p:nvPr>
+        </p:nvSpPr>
+        <p:spPr/>
+        <p:txBody>
+          <a:bodyPr/>
+          <a:lstStyle/>
+          <a:p>
+            <a:r>
+              <a:rPr lang="de-DE" dirty="0" err="1"/>
+              <a:t>Subject</a:t>
+            </a:r>
+            <a:r>
+              <a:rPr lang="de-DE" dirty="0"/>
+              <a:t> </a:t>
+            </a:r>
+            <a:r>
+              <a:rPr lang="de-DE" dirty="0" err="1"/>
+              <a:t>Behavior</a:t>
+            </a:r>
+            <a:endParaRPr lang="de-DE" dirty="0"/>
+          </a:p>
+        </p:txBody>
+      </p:sp>
+      <p:pic>
+        <p:nvPicPr>
+          <p:cNvPr id="4" name="Grafik 3">
+            <a:extLst>
+              <a:ext uri="{FF2B5EF4-FFF2-40B4-BE49-F238E27FC236}">
+                <a16:creationId xmlns:a16="http://schemas.microsoft.com/office/drawing/2014/main" id="{97344F08-1CB0-4BF9-B84B-B60AEE50378C}"/>
+              </a:ext>
+            </a:extLst>
+          </p:cNvPr>
+          <p:cNvPicPr>
+            <a:picLocks noChangeAspect="1"/>
+          </p:cNvPicPr>
+          <p:nvPr/>
+        </p:nvPicPr>
+        <p:blipFill rotWithShape="1">
+          <a:blip r:embed="rId2">
+            <a:extLst>
+              <a:ext uri="{28A0092B-C50C-407E-A947-70E740481C1C}">
+                <a14:useLocalDpi xmlns:a14="http://schemas.microsoft.com/office/drawing/2010/main" val="0"/>
+              </a:ext>
+            </a:extLst>
+          </a:blip>
+          <a:srcRect l="5264" t="7512" r="-2453" b="60847"/>
+          <a:stretch/>
+        </p:blipFill>
+        <p:spPr>
+          <a:xfrm>
+            <a:off x="2779486" y="2293256"/>
+            <a:ext cx="5392057" cy="2169887"/>
+          </a:xfrm>
+          <a:prstGeom prst="rect">
+            <a:avLst/>
+          </a:prstGeom>
+        </p:spPr>
+      </p:pic>
+    </p:spTree>
+    <p:extLst>
+      <p:ext uri="{BB962C8B-B14F-4D97-AF65-F5344CB8AC3E}">
+        <p14:creationId xmlns:p14="http://schemas.microsoft.com/office/powerpoint/2010/main" val="1708331226"/>
+      </p:ext>
+    </p:extLst>
+  </p:cSld>
+  <p:clrMapOvr>
+    <a:masterClrMapping/>
+  </p:clrMapOvr>
+</p:sld>
+</file>
+
+<file path=ppt/slides/slide16.xml><?xml version="1.0" encoding="utf-8"?>
+<p:sld xmlns:a="http://schemas.openxmlformats.org/drawingml/2006/main" xmlns:r="http://schemas.openxmlformats.org/officeDocument/2006/relationships" xmlns:p="http://schemas.openxmlformats.org/presentationml/2006/main">
+  <p:cSld>
+    <p:spTree>
+      <p:nvGrpSpPr>
+        <p:cNvPr id="1" name=""/>
+        <p:cNvGrpSpPr/>
+        <p:nvPr/>
+      </p:nvGrpSpPr>
+      <p:grpSpPr>
+        <a:xfrm>
+          <a:off x="0" y="0"/>
+          <a:ext cx="0" cy="0"/>
+          <a:chOff x="0" y="0"/>
+          <a:chExt cx="0" cy="0"/>
+        </a:xfrm>
+      </p:grpSpPr>
+      <p:sp>
+        <p:nvSpPr>
+          <p:cNvPr id="2" name="Titel 1">
+            <a:extLst>
+              <a:ext uri="{FF2B5EF4-FFF2-40B4-BE49-F238E27FC236}">
+                <a16:creationId xmlns:a16="http://schemas.microsoft.com/office/drawing/2014/main" id="{67EB694C-71AB-492E-A86E-77FDE4886B78}"/>
+              </a:ext>
+            </a:extLst>
+          </p:cNvPr>
+          <p:cNvSpPr>
+            <a:spLocks noGrp="1"/>
+          </p:cNvSpPr>
+          <p:nvPr>
+            <p:ph type="title"/>
+          </p:nvPr>
+        </p:nvSpPr>
+        <p:spPr>
+          <a:xfrm>
+            <a:off x="838200" y="365125"/>
+            <a:ext cx="6056586" cy="423151"/>
+          </a:xfrm>
+        </p:spPr>
+        <p:txBody>
+          <a:bodyPr>
+            <a:normAutofit/>
+          </a:bodyPr>
+          <a:lstStyle/>
+          <a:p>
+            <a:r>
+              <a:rPr lang="de-DE" sz="1600" dirty="0" err="1"/>
+              <a:t>SubjectBaseBehavior</a:t>
+            </a:r>
+            <a:endParaRPr lang="de-DE" sz="1600" dirty="0"/>
+          </a:p>
+        </p:txBody>
+      </p:sp>
+      <p:pic>
+        <p:nvPicPr>
+          <p:cNvPr id="4" name="Grafik 3">
+            <a:extLst>
+              <a:ext uri="{FF2B5EF4-FFF2-40B4-BE49-F238E27FC236}">
+                <a16:creationId xmlns:a16="http://schemas.microsoft.com/office/drawing/2014/main" id="{E52811FD-F8AF-4568-B300-0B1B43FA7CCE}"/>
+              </a:ext>
+            </a:extLst>
+          </p:cNvPr>
+          <p:cNvPicPr>
+            <a:picLocks noChangeAspect="1"/>
+          </p:cNvPicPr>
+          <p:nvPr/>
+        </p:nvPicPr>
+        <p:blipFill rotWithShape="1">
+          <a:blip r:embed="rId2">
+            <a:extLst>
+              <a:ext uri="{28A0092B-C50C-407E-A947-70E740481C1C}">
+                <a14:useLocalDpi xmlns:a14="http://schemas.microsoft.com/office/drawing/2010/main" val="0"/>
+              </a:ext>
+            </a:extLst>
+          </a:blip>
+          <a:srcRect l="5517" t="6546" r="4742" b="7592"/>
+          <a:stretch/>
+        </p:blipFill>
+        <p:spPr>
+          <a:xfrm>
+            <a:off x="0" y="880351"/>
+            <a:ext cx="10941269" cy="5612524"/>
+          </a:xfrm>
+          <a:prstGeom prst="rect">
+            <a:avLst/>
+          </a:prstGeom>
+        </p:spPr>
+      </p:pic>
+      <p:pic>
+        <p:nvPicPr>
+          <p:cNvPr id="5" name="Grafik 4">
+            <a:extLst>
+              <a:ext uri="{FF2B5EF4-FFF2-40B4-BE49-F238E27FC236}">
+                <a16:creationId xmlns:a16="http://schemas.microsoft.com/office/drawing/2014/main" id="{2EED845E-CCFF-477A-99C4-74E29ED1F7F7}"/>
+              </a:ext>
+            </a:extLst>
+          </p:cNvPr>
+          <p:cNvPicPr>
+            <a:picLocks noChangeAspect="1"/>
+          </p:cNvPicPr>
+          <p:nvPr/>
+        </p:nvPicPr>
+        <p:blipFill>
+          <a:blip r:embed="rId3"/>
+          <a:stretch>
+            <a:fillRect/>
+          </a:stretch>
+        </p:blipFill>
+        <p:spPr>
+          <a:xfrm>
+            <a:off x="7514463" y="497600"/>
+            <a:ext cx="3633072" cy="2368933"/>
+          </a:xfrm>
+          <a:prstGeom prst="rect">
+            <a:avLst/>
+          </a:prstGeom>
+        </p:spPr>
+      </p:pic>
+    </p:spTree>
+    <p:extLst>
+      <p:ext uri="{BB962C8B-B14F-4D97-AF65-F5344CB8AC3E}">
+        <p14:creationId xmlns:p14="http://schemas.microsoft.com/office/powerpoint/2010/main" val="1636160901"/>
+      </p:ext>
+    </p:extLst>
+  </p:cSld>
+  <p:clrMapOvr>
+    <a:masterClrMapping/>
+  </p:clrMapOvr>
+</p:sld>
+</file>
+
+<file path=ppt/slides/slide17.xml><?xml version="1.0" encoding="utf-8"?>
 <p:sld xmlns:a="http://schemas.openxmlformats.org/drawingml/2006/main" xmlns:r="http://schemas.openxmlformats.org/officeDocument/2006/relationships" xmlns:p="http://schemas.openxmlformats.org/presentationml/2006/main">
   <p:cSld>
     <p:spTree>

</xml_diff>